<commit_message>
woking on getting v2 api working and added to sql
</commit_message>
<xml_diff>
--- a/TDI/TDI_finals.pptx
+++ b/TDI/TDI_finals.pptx
@@ -4,6 +4,9 @@
   <p:sldMasterIdLst>
     <p:sldMasterId id="2147483660" r:id="rId1"/>
   </p:sldMasterIdLst>
+  <p:notesMasterIdLst>
+    <p:notesMasterId r:id="rId8"/>
+  </p:notesMasterIdLst>
   <p:sldIdLst>
     <p:sldId id="260" r:id="rId2"/>
     <p:sldId id="258" r:id="rId3"/>
@@ -117,6 +120,672 @@
 </p:presentation>
 </file>
 
+<file path=ppt/notesMasters/notesMaster1.xml><?xml version="1.0" encoding="utf-8"?>
+<p:notesMaster xmlns:a="http://schemas.openxmlformats.org/drawingml/2006/main" xmlns:r="http://schemas.openxmlformats.org/officeDocument/2006/relationships" xmlns:p="http://schemas.openxmlformats.org/presentationml/2006/main">
+  <p:cSld>
+    <p:bg>
+      <p:bgRef idx="1001">
+        <a:schemeClr val="bg1"/>
+      </p:bgRef>
+    </p:bg>
+    <p:spTree>
+      <p:nvGrpSpPr>
+        <p:cNvPr id="1" name=""/>
+        <p:cNvGrpSpPr/>
+        <p:nvPr/>
+      </p:nvGrpSpPr>
+      <p:grpSpPr>
+        <a:xfrm>
+          <a:off x="0" y="0"/>
+          <a:ext cx="0" cy="0"/>
+          <a:chOff x="0" y="0"/>
+          <a:chExt cx="0" cy="0"/>
+        </a:xfrm>
+      </p:grpSpPr>
+      <p:sp>
+        <p:nvSpPr>
+          <p:cNvPr id="2" name="Header Placeholder 1"/>
+          <p:cNvSpPr>
+            <a:spLocks noGrp="1"/>
+          </p:cNvSpPr>
+          <p:nvPr>
+            <p:ph type="hdr" sz="quarter"/>
+          </p:nvPr>
+        </p:nvSpPr>
+        <p:spPr>
+          <a:xfrm>
+            <a:off x="0" y="0"/>
+            <a:ext cx="2971800" cy="458788"/>
+          </a:xfrm>
+          <a:prstGeom prst="rect">
+            <a:avLst/>
+          </a:prstGeom>
+        </p:spPr>
+        <p:txBody>
+          <a:bodyPr vert="horz" lIns="91440" tIns="45720" rIns="91440" bIns="45720" rtlCol="0"/>
+          <a:lstStyle>
+            <a:lvl1pPr algn="l">
+              <a:defRPr sz="1200"/>
+            </a:lvl1pPr>
+          </a:lstStyle>
+          <a:p>
+            <a:endParaRPr lang="en-US"/>
+          </a:p>
+        </p:txBody>
+      </p:sp>
+      <p:sp>
+        <p:nvSpPr>
+          <p:cNvPr id="3" name="Date Placeholder 2"/>
+          <p:cNvSpPr>
+            <a:spLocks noGrp="1"/>
+          </p:cNvSpPr>
+          <p:nvPr>
+            <p:ph type="dt" idx="1"/>
+          </p:nvPr>
+        </p:nvSpPr>
+        <p:spPr>
+          <a:xfrm>
+            <a:off x="3884613" y="0"/>
+            <a:ext cx="2971800" cy="458788"/>
+          </a:xfrm>
+          <a:prstGeom prst="rect">
+            <a:avLst/>
+          </a:prstGeom>
+        </p:spPr>
+        <p:txBody>
+          <a:bodyPr vert="horz" lIns="91440" tIns="45720" rIns="91440" bIns="45720" rtlCol="0"/>
+          <a:lstStyle>
+            <a:lvl1pPr algn="r">
+              <a:defRPr sz="1200"/>
+            </a:lvl1pPr>
+          </a:lstStyle>
+          <a:p>
+            <a:fld id="{DF3E082A-6A49-4DD0-9794-99AC4565B14C}" type="datetimeFigureOut">
+              <a:rPr lang="en-US" smtClean="0"/>
+              <a:t>10/1/2021</a:t>
+            </a:fld>
+            <a:endParaRPr lang="en-US"/>
+          </a:p>
+        </p:txBody>
+      </p:sp>
+      <p:sp>
+        <p:nvSpPr>
+          <p:cNvPr id="4" name="Slide Image Placeholder 3"/>
+          <p:cNvSpPr>
+            <a:spLocks noGrp="1" noRot="1" noChangeAspect="1"/>
+          </p:cNvSpPr>
+          <p:nvPr>
+            <p:ph type="sldImg" idx="2"/>
+          </p:nvPr>
+        </p:nvSpPr>
+        <p:spPr>
+          <a:xfrm>
+            <a:off x="685800" y="1143000"/>
+            <a:ext cx="5486400" cy="3086100"/>
+          </a:xfrm>
+          <a:prstGeom prst="rect">
+            <a:avLst/>
+          </a:prstGeom>
+          <a:noFill/>
+          <a:ln w="12700">
+            <a:solidFill>
+              <a:prstClr val="black"/>
+            </a:solidFill>
+          </a:ln>
+        </p:spPr>
+        <p:txBody>
+          <a:bodyPr vert="horz" lIns="91440" tIns="45720" rIns="91440" bIns="45720" rtlCol="0" anchor="ctr"/>
+          <a:lstStyle/>
+          <a:p>
+            <a:endParaRPr lang="en-US"/>
+          </a:p>
+        </p:txBody>
+      </p:sp>
+      <p:sp>
+        <p:nvSpPr>
+          <p:cNvPr id="5" name="Notes Placeholder 4"/>
+          <p:cNvSpPr>
+            <a:spLocks noGrp="1"/>
+          </p:cNvSpPr>
+          <p:nvPr>
+            <p:ph type="body" sz="quarter" idx="3"/>
+          </p:nvPr>
+        </p:nvSpPr>
+        <p:spPr>
+          <a:xfrm>
+            <a:off x="685800" y="4400550"/>
+            <a:ext cx="5486400" cy="3600450"/>
+          </a:xfrm>
+          <a:prstGeom prst="rect">
+            <a:avLst/>
+          </a:prstGeom>
+        </p:spPr>
+        <p:txBody>
+          <a:bodyPr vert="horz" lIns="91440" tIns="45720" rIns="91440" bIns="45720" rtlCol="0"/>
+          <a:lstStyle/>
+          <a:p>
+            <a:pPr lvl="0"/>
+            <a:r>
+              <a:rPr lang="en-US"/>
+              <a:t>Click to edit Master text styles</a:t>
+            </a:r>
+          </a:p>
+          <a:p>
+            <a:pPr lvl="1"/>
+            <a:r>
+              <a:rPr lang="en-US"/>
+              <a:t>Second level</a:t>
+            </a:r>
+          </a:p>
+          <a:p>
+            <a:pPr lvl="2"/>
+            <a:r>
+              <a:rPr lang="en-US"/>
+              <a:t>Third level</a:t>
+            </a:r>
+          </a:p>
+          <a:p>
+            <a:pPr lvl="3"/>
+            <a:r>
+              <a:rPr lang="en-US"/>
+              <a:t>Fourth level</a:t>
+            </a:r>
+          </a:p>
+          <a:p>
+            <a:pPr lvl="4"/>
+            <a:r>
+              <a:rPr lang="en-US"/>
+              <a:t>Fifth level</a:t>
+            </a:r>
+          </a:p>
+        </p:txBody>
+      </p:sp>
+      <p:sp>
+        <p:nvSpPr>
+          <p:cNvPr id="6" name="Footer Placeholder 5"/>
+          <p:cNvSpPr>
+            <a:spLocks noGrp="1"/>
+          </p:cNvSpPr>
+          <p:nvPr>
+            <p:ph type="ftr" sz="quarter" idx="4"/>
+          </p:nvPr>
+        </p:nvSpPr>
+        <p:spPr>
+          <a:xfrm>
+            <a:off x="0" y="8685213"/>
+            <a:ext cx="2971800" cy="458787"/>
+          </a:xfrm>
+          <a:prstGeom prst="rect">
+            <a:avLst/>
+          </a:prstGeom>
+        </p:spPr>
+        <p:txBody>
+          <a:bodyPr vert="horz" lIns="91440" tIns="45720" rIns="91440" bIns="45720" rtlCol="0" anchor="b"/>
+          <a:lstStyle>
+            <a:lvl1pPr algn="l">
+              <a:defRPr sz="1200"/>
+            </a:lvl1pPr>
+          </a:lstStyle>
+          <a:p>
+            <a:endParaRPr lang="en-US"/>
+          </a:p>
+        </p:txBody>
+      </p:sp>
+      <p:sp>
+        <p:nvSpPr>
+          <p:cNvPr id="7" name="Slide Number Placeholder 6"/>
+          <p:cNvSpPr>
+            <a:spLocks noGrp="1"/>
+          </p:cNvSpPr>
+          <p:nvPr>
+            <p:ph type="sldNum" sz="quarter" idx="5"/>
+          </p:nvPr>
+        </p:nvSpPr>
+        <p:spPr>
+          <a:xfrm>
+            <a:off x="3884613" y="8685213"/>
+            <a:ext cx="2971800" cy="458787"/>
+          </a:xfrm>
+          <a:prstGeom prst="rect">
+            <a:avLst/>
+          </a:prstGeom>
+        </p:spPr>
+        <p:txBody>
+          <a:bodyPr vert="horz" lIns="91440" tIns="45720" rIns="91440" bIns="45720" rtlCol="0" anchor="b"/>
+          <a:lstStyle>
+            <a:lvl1pPr algn="r">
+              <a:defRPr sz="1200"/>
+            </a:lvl1pPr>
+          </a:lstStyle>
+          <a:p>
+            <a:fld id="{FCF85715-091D-4CC5-B0BD-9CC5D11D4EDF}" type="slidenum">
+              <a:rPr lang="en-US" smtClean="0"/>
+              <a:t>‹#›</a:t>
+            </a:fld>
+            <a:endParaRPr lang="en-US"/>
+          </a:p>
+        </p:txBody>
+      </p:sp>
+    </p:spTree>
+    <p:extLst>
+      <p:ext uri="{BB962C8B-B14F-4D97-AF65-F5344CB8AC3E}">
+        <p14:creationId xmlns:p14="http://schemas.microsoft.com/office/powerpoint/2010/main" val="2770013645"/>
+      </p:ext>
+    </p:extLst>
+  </p:cSld>
+  <p:clrMap bg1="lt1" tx1="dk1" bg2="lt2" tx2="dk2" accent1="accent1" accent2="accent2" accent3="accent3" accent4="accent4" accent5="accent5" accent6="accent6" hlink="hlink" folHlink="folHlink"/>
+  <p:notesStyle>
+    <a:lvl1pPr marL="0" algn="l" defTabSz="914400" rtl="0" eaLnBrk="1" latinLnBrk="0" hangingPunct="1">
+      <a:defRPr sz="1200" kern="1200">
+        <a:solidFill>
+          <a:schemeClr val="tx1"/>
+        </a:solidFill>
+        <a:latin typeface="+mn-lt"/>
+        <a:ea typeface="+mn-ea"/>
+        <a:cs typeface="+mn-cs"/>
+      </a:defRPr>
+    </a:lvl1pPr>
+    <a:lvl2pPr marL="457200" algn="l" defTabSz="914400" rtl="0" eaLnBrk="1" latinLnBrk="0" hangingPunct="1">
+      <a:defRPr sz="1200" kern="1200">
+        <a:solidFill>
+          <a:schemeClr val="tx1"/>
+        </a:solidFill>
+        <a:latin typeface="+mn-lt"/>
+        <a:ea typeface="+mn-ea"/>
+        <a:cs typeface="+mn-cs"/>
+      </a:defRPr>
+    </a:lvl2pPr>
+    <a:lvl3pPr marL="914400" algn="l" defTabSz="914400" rtl="0" eaLnBrk="1" latinLnBrk="0" hangingPunct="1">
+      <a:defRPr sz="1200" kern="1200">
+        <a:solidFill>
+          <a:schemeClr val="tx1"/>
+        </a:solidFill>
+        <a:latin typeface="+mn-lt"/>
+        <a:ea typeface="+mn-ea"/>
+        <a:cs typeface="+mn-cs"/>
+      </a:defRPr>
+    </a:lvl3pPr>
+    <a:lvl4pPr marL="1371600" algn="l" defTabSz="914400" rtl="0" eaLnBrk="1" latinLnBrk="0" hangingPunct="1">
+      <a:defRPr sz="1200" kern="1200">
+        <a:solidFill>
+          <a:schemeClr val="tx1"/>
+        </a:solidFill>
+        <a:latin typeface="+mn-lt"/>
+        <a:ea typeface="+mn-ea"/>
+        <a:cs typeface="+mn-cs"/>
+      </a:defRPr>
+    </a:lvl4pPr>
+    <a:lvl5pPr marL="1828800" algn="l" defTabSz="914400" rtl="0" eaLnBrk="1" latinLnBrk="0" hangingPunct="1">
+      <a:defRPr sz="1200" kern="1200">
+        <a:solidFill>
+          <a:schemeClr val="tx1"/>
+        </a:solidFill>
+        <a:latin typeface="+mn-lt"/>
+        <a:ea typeface="+mn-ea"/>
+        <a:cs typeface="+mn-cs"/>
+      </a:defRPr>
+    </a:lvl5pPr>
+    <a:lvl6pPr marL="2286000" algn="l" defTabSz="914400" rtl="0" eaLnBrk="1" latinLnBrk="0" hangingPunct="1">
+      <a:defRPr sz="1200" kern="1200">
+        <a:solidFill>
+          <a:schemeClr val="tx1"/>
+        </a:solidFill>
+        <a:latin typeface="+mn-lt"/>
+        <a:ea typeface="+mn-ea"/>
+        <a:cs typeface="+mn-cs"/>
+      </a:defRPr>
+    </a:lvl6pPr>
+    <a:lvl7pPr marL="2743200" algn="l" defTabSz="914400" rtl="0" eaLnBrk="1" latinLnBrk="0" hangingPunct="1">
+      <a:defRPr sz="1200" kern="1200">
+        <a:solidFill>
+          <a:schemeClr val="tx1"/>
+        </a:solidFill>
+        <a:latin typeface="+mn-lt"/>
+        <a:ea typeface="+mn-ea"/>
+        <a:cs typeface="+mn-cs"/>
+      </a:defRPr>
+    </a:lvl7pPr>
+    <a:lvl8pPr marL="3200400" algn="l" defTabSz="914400" rtl="0" eaLnBrk="1" latinLnBrk="0" hangingPunct="1">
+      <a:defRPr sz="1200" kern="1200">
+        <a:solidFill>
+          <a:schemeClr val="tx1"/>
+        </a:solidFill>
+        <a:latin typeface="+mn-lt"/>
+        <a:ea typeface="+mn-ea"/>
+        <a:cs typeface="+mn-cs"/>
+      </a:defRPr>
+    </a:lvl8pPr>
+    <a:lvl9pPr marL="3657600" algn="l" defTabSz="914400" rtl="0" eaLnBrk="1" latinLnBrk="0" hangingPunct="1">
+      <a:defRPr sz="1200" kern="1200">
+        <a:solidFill>
+          <a:schemeClr val="tx1"/>
+        </a:solidFill>
+        <a:latin typeface="+mn-lt"/>
+        <a:ea typeface="+mn-ea"/>
+        <a:cs typeface="+mn-cs"/>
+      </a:defRPr>
+    </a:lvl9pPr>
+  </p:notesStyle>
+</p:notesMaster>
+</file>
+
+<file path=ppt/notesSlides/notesSlide1.xml><?xml version="1.0" encoding="utf-8"?>
+<p:notes xmlns:a="http://schemas.openxmlformats.org/drawingml/2006/main" xmlns:r="http://schemas.openxmlformats.org/officeDocument/2006/relationships" xmlns:p="http://schemas.openxmlformats.org/presentationml/2006/main">
+  <p:cSld>
+    <p:spTree>
+      <p:nvGrpSpPr>
+        <p:cNvPr id="1" name=""/>
+        <p:cNvGrpSpPr/>
+        <p:nvPr/>
+      </p:nvGrpSpPr>
+      <p:grpSpPr>
+        <a:xfrm>
+          <a:off x="0" y="0"/>
+          <a:ext cx="0" cy="0"/>
+          <a:chOff x="0" y="0"/>
+          <a:chExt cx="0" cy="0"/>
+        </a:xfrm>
+      </p:grpSpPr>
+      <p:sp>
+        <p:nvSpPr>
+          <p:cNvPr id="2" name="Slide Image Placeholder 1"/>
+          <p:cNvSpPr>
+            <a:spLocks noGrp="1" noRot="1" noChangeAspect="1"/>
+          </p:cNvSpPr>
+          <p:nvPr>
+            <p:ph type="sldImg"/>
+          </p:nvPr>
+        </p:nvSpPr>
+        <p:spPr/>
+      </p:sp>
+      <p:sp>
+        <p:nvSpPr>
+          <p:cNvPr id="3" name="Notes Placeholder 2"/>
+          <p:cNvSpPr>
+            <a:spLocks noGrp="1"/>
+          </p:cNvSpPr>
+          <p:nvPr>
+            <p:ph type="body" idx="1"/>
+          </p:nvPr>
+        </p:nvSpPr>
+        <p:spPr/>
+        <p:txBody>
+          <a:bodyPr/>
+          <a:lstStyle/>
+          <a:p>
+            <a:r>
+              <a:rPr lang="en-US" dirty="0"/>
+              <a:t>Skip the intro, avoid the academic ness.</a:t>
+            </a:r>
+          </a:p>
+          <a:p>
+            <a:endParaRPr lang="en-US" dirty="0"/>
+          </a:p>
+          <a:p>
+            <a:r>
+              <a:rPr lang="en-US" dirty="0"/>
+              <a:t>Just start with – people play this, people do this, </a:t>
+            </a:r>
+          </a:p>
+          <a:p>
+            <a:endParaRPr lang="en-US" dirty="0"/>
+          </a:p>
+          <a:p>
+            <a:endParaRPr lang="en-US" dirty="0"/>
+          </a:p>
+          <a:p>
+            <a:r>
+              <a:rPr lang="en-US" dirty="0"/>
+              <a:t>Try to focus it and get the story correct</a:t>
+            </a:r>
+          </a:p>
+          <a:p>
+            <a:endParaRPr lang="en-US" dirty="0"/>
+          </a:p>
+          <a:p>
+            <a:endParaRPr lang="en-US" dirty="0"/>
+          </a:p>
+          <a:p>
+            <a:endParaRPr lang="en-US" dirty="0"/>
+          </a:p>
+        </p:txBody>
+      </p:sp>
+      <p:sp>
+        <p:nvSpPr>
+          <p:cNvPr id="4" name="Slide Number Placeholder 3"/>
+          <p:cNvSpPr>
+            <a:spLocks noGrp="1"/>
+          </p:cNvSpPr>
+          <p:nvPr>
+            <p:ph type="sldNum" sz="quarter" idx="5"/>
+          </p:nvPr>
+        </p:nvSpPr>
+        <p:spPr/>
+        <p:txBody>
+          <a:bodyPr/>
+          <a:lstStyle/>
+          <a:p>
+            <a:fld id="{FCF85715-091D-4CC5-B0BD-9CC5D11D4EDF}" type="slidenum">
+              <a:rPr lang="en-US" smtClean="0"/>
+              <a:t>1</a:t>
+            </a:fld>
+            <a:endParaRPr lang="en-US"/>
+          </a:p>
+        </p:txBody>
+      </p:sp>
+    </p:spTree>
+    <p:extLst>
+      <p:ext uri="{BB962C8B-B14F-4D97-AF65-F5344CB8AC3E}">
+        <p14:creationId xmlns:p14="http://schemas.microsoft.com/office/powerpoint/2010/main" val="3555448465"/>
+      </p:ext>
+    </p:extLst>
+  </p:cSld>
+  <p:clrMapOvr>
+    <a:masterClrMapping/>
+  </p:clrMapOvr>
+</p:notes>
+</file>
+
+<file path=ppt/notesSlides/notesSlide2.xml><?xml version="1.0" encoding="utf-8"?>
+<p:notes xmlns:a="http://schemas.openxmlformats.org/drawingml/2006/main" xmlns:r="http://schemas.openxmlformats.org/officeDocument/2006/relationships" xmlns:p="http://schemas.openxmlformats.org/presentationml/2006/main">
+  <p:cSld>
+    <p:spTree>
+      <p:nvGrpSpPr>
+        <p:cNvPr id="1" name=""/>
+        <p:cNvGrpSpPr/>
+        <p:nvPr/>
+      </p:nvGrpSpPr>
+      <p:grpSpPr>
+        <a:xfrm>
+          <a:off x="0" y="0"/>
+          <a:ext cx="0" cy="0"/>
+          <a:chOff x="0" y="0"/>
+          <a:chExt cx="0" cy="0"/>
+        </a:xfrm>
+      </p:grpSpPr>
+      <p:sp>
+        <p:nvSpPr>
+          <p:cNvPr id="2" name="Slide Image Placeholder 1"/>
+          <p:cNvSpPr>
+            <a:spLocks noGrp="1" noRot="1" noChangeAspect="1"/>
+          </p:cNvSpPr>
+          <p:nvPr>
+            <p:ph type="sldImg"/>
+          </p:nvPr>
+        </p:nvSpPr>
+        <p:spPr/>
+      </p:sp>
+      <p:sp>
+        <p:nvSpPr>
+          <p:cNvPr id="3" name="Notes Placeholder 2"/>
+          <p:cNvSpPr>
+            <a:spLocks noGrp="1"/>
+          </p:cNvSpPr>
+          <p:nvPr>
+            <p:ph type="body" idx="1"/>
+          </p:nvPr>
+        </p:nvSpPr>
+        <p:spPr/>
+        <p:txBody>
+          <a:bodyPr/>
+          <a:lstStyle/>
+          <a:p>
+            <a:r>
+              <a:rPr lang="en-US" dirty="0"/>
+              <a:t>Speed this up, need to tell them why they care early on</a:t>
+            </a:r>
+          </a:p>
+          <a:p>
+            <a:endParaRPr lang="en-US" dirty="0"/>
+          </a:p>
+          <a:p>
+            <a:r>
+              <a:rPr lang="en-US" dirty="0"/>
+              <a:t>Talk about why they should care here, need to talk </a:t>
+            </a:r>
+            <a:r>
+              <a:rPr lang="en-US"/>
+              <a:t>more about why to fix this</a:t>
+            </a:r>
+            <a:endParaRPr lang="en-US" dirty="0"/>
+          </a:p>
+        </p:txBody>
+      </p:sp>
+      <p:sp>
+        <p:nvSpPr>
+          <p:cNvPr id="4" name="Slide Number Placeholder 3"/>
+          <p:cNvSpPr>
+            <a:spLocks noGrp="1"/>
+          </p:cNvSpPr>
+          <p:nvPr>
+            <p:ph type="sldNum" sz="quarter" idx="5"/>
+          </p:nvPr>
+        </p:nvSpPr>
+        <p:spPr/>
+        <p:txBody>
+          <a:bodyPr/>
+          <a:lstStyle/>
+          <a:p>
+            <a:fld id="{FCF85715-091D-4CC5-B0BD-9CC5D11D4EDF}" type="slidenum">
+              <a:rPr lang="en-US" smtClean="0"/>
+              <a:t>2</a:t>
+            </a:fld>
+            <a:endParaRPr lang="en-US"/>
+          </a:p>
+        </p:txBody>
+      </p:sp>
+    </p:spTree>
+    <p:extLst>
+      <p:ext uri="{BB962C8B-B14F-4D97-AF65-F5344CB8AC3E}">
+        <p14:creationId xmlns:p14="http://schemas.microsoft.com/office/powerpoint/2010/main" val="1799380260"/>
+      </p:ext>
+    </p:extLst>
+  </p:cSld>
+  <p:clrMapOvr>
+    <a:masterClrMapping/>
+  </p:clrMapOvr>
+</p:notes>
+</file>
+
+<file path=ppt/notesSlides/notesSlide3.xml><?xml version="1.0" encoding="utf-8"?>
+<p:notes xmlns:a="http://schemas.openxmlformats.org/drawingml/2006/main" xmlns:r="http://schemas.openxmlformats.org/officeDocument/2006/relationships" xmlns:p="http://schemas.openxmlformats.org/presentationml/2006/main">
+  <p:cSld>
+    <p:spTree>
+      <p:nvGrpSpPr>
+        <p:cNvPr id="1" name=""/>
+        <p:cNvGrpSpPr/>
+        <p:nvPr/>
+      </p:nvGrpSpPr>
+      <p:grpSpPr>
+        <a:xfrm>
+          <a:off x="0" y="0"/>
+          <a:ext cx="0" cy="0"/>
+          <a:chOff x="0" y="0"/>
+          <a:chExt cx="0" cy="0"/>
+        </a:xfrm>
+      </p:grpSpPr>
+      <p:sp>
+        <p:nvSpPr>
+          <p:cNvPr id="2" name="Slide Image Placeholder 1"/>
+          <p:cNvSpPr>
+            <a:spLocks noGrp="1" noRot="1" noChangeAspect="1"/>
+          </p:cNvSpPr>
+          <p:nvPr>
+            <p:ph type="sldImg"/>
+          </p:nvPr>
+        </p:nvSpPr>
+        <p:spPr/>
+      </p:sp>
+      <p:sp>
+        <p:nvSpPr>
+          <p:cNvPr id="3" name="Notes Placeholder 2"/>
+          <p:cNvSpPr>
+            <a:spLocks noGrp="1"/>
+          </p:cNvSpPr>
+          <p:nvPr>
+            <p:ph type="body" idx="1"/>
+          </p:nvPr>
+        </p:nvSpPr>
+        <p:spPr/>
+        <p:txBody>
+          <a:bodyPr/>
+          <a:lstStyle/>
+          <a:p>
+            <a:r>
+              <a:rPr lang="en-US" dirty="0"/>
+              <a:t>To much on the method, need more on the business side of things</a:t>
+            </a:r>
+          </a:p>
+          <a:p>
+            <a:endParaRPr lang="en-US" dirty="0"/>
+          </a:p>
+          <a:p>
+            <a:endParaRPr lang="en-US" dirty="0"/>
+          </a:p>
+          <a:p>
+            <a:r>
+              <a:rPr lang="en-US" dirty="0"/>
+              <a:t>Change color/size to make it bigger for this</a:t>
+            </a:r>
+          </a:p>
+        </p:txBody>
+      </p:sp>
+      <p:sp>
+        <p:nvSpPr>
+          <p:cNvPr id="4" name="Slide Number Placeholder 3"/>
+          <p:cNvSpPr>
+            <a:spLocks noGrp="1"/>
+          </p:cNvSpPr>
+          <p:nvPr>
+            <p:ph type="sldNum" sz="quarter" idx="5"/>
+          </p:nvPr>
+        </p:nvSpPr>
+        <p:spPr/>
+        <p:txBody>
+          <a:bodyPr/>
+          <a:lstStyle/>
+          <a:p>
+            <a:fld id="{FCF85715-091D-4CC5-B0BD-9CC5D11D4EDF}" type="slidenum">
+              <a:rPr lang="en-US" smtClean="0"/>
+              <a:t>4</a:t>
+            </a:fld>
+            <a:endParaRPr lang="en-US"/>
+          </a:p>
+        </p:txBody>
+      </p:sp>
+    </p:spTree>
+    <p:extLst>
+      <p:ext uri="{BB962C8B-B14F-4D97-AF65-F5344CB8AC3E}">
+        <p14:creationId xmlns:p14="http://schemas.microsoft.com/office/powerpoint/2010/main" val="2260032227"/>
+      </p:ext>
+    </p:extLst>
+  </p:cSld>
+  <p:clrMapOvr>
+    <a:masterClrMapping/>
+  </p:clrMapOvr>
+</p:notes>
+</file>
+
 <file path=ppt/slideLayouts/slideLayout1.xml><?xml version="1.0" encoding="utf-8"?>
 <p:sldLayout xmlns:a="http://schemas.openxmlformats.org/drawingml/2006/main" xmlns:r="http://schemas.openxmlformats.org/officeDocument/2006/relationships" xmlns:p="http://schemas.openxmlformats.org/presentationml/2006/main" type="title" preserve="1">
   <p:cSld name="Title Slide">
@@ -248,7 +917,7 @@
           <a:p>
             <a:fld id="{E71A4870-E222-4CD6-881F-7AD8134D3EF7}" type="datetimeFigureOut">
               <a:rPr lang="en-US" smtClean="0"/>
-              <a:t>8/19/2021</a:t>
+              <a:t>10/1/2021</a:t>
             </a:fld>
             <a:endParaRPr lang="en-US"/>
           </a:p>
@@ -418,7 +1087,7 @@
           <a:p>
             <a:fld id="{E71A4870-E222-4CD6-881F-7AD8134D3EF7}" type="datetimeFigureOut">
               <a:rPr lang="en-US" smtClean="0"/>
-              <a:t>8/19/2021</a:t>
+              <a:t>10/1/2021</a:t>
             </a:fld>
             <a:endParaRPr lang="en-US"/>
           </a:p>
@@ -598,7 +1267,7 @@
           <a:p>
             <a:fld id="{E71A4870-E222-4CD6-881F-7AD8134D3EF7}" type="datetimeFigureOut">
               <a:rPr lang="en-US" smtClean="0"/>
-              <a:t>8/19/2021</a:t>
+              <a:t>10/1/2021</a:t>
             </a:fld>
             <a:endParaRPr lang="en-US"/>
           </a:p>
@@ -768,7 +1437,7 @@
           <a:p>
             <a:fld id="{E71A4870-E222-4CD6-881F-7AD8134D3EF7}" type="datetimeFigureOut">
               <a:rPr lang="en-US" smtClean="0"/>
-              <a:t>8/19/2021</a:t>
+              <a:t>10/1/2021</a:t>
             </a:fld>
             <a:endParaRPr lang="en-US"/>
           </a:p>
@@ -1014,7 +1683,7 @@
           <a:p>
             <a:fld id="{E71A4870-E222-4CD6-881F-7AD8134D3EF7}" type="datetimeFigureOut">
               <a:rPr lang="en-US" smtClean="0"/>
-              <a:t>8/19/2021</a:t>
+              <a:t>10/1/2021</a:t>
             </a:fld>
             <a:endParaRPr lang="en-US"/>
           </a:p>
@@ -1246,7 +1915,7 @@
           <a:p>
             <a:fld id="{E71A4870-E222-4CD6-881F-7AD8134D3EF7}" type="datetimeFigureOut">
               <a:rPr lang="en-US" smtClean="0"/>
-              <a:t>8/19/2021</a:t>
+              <a:t>10/1/2021</a:t>
             </a:fld>
             <a:endParaRPr lang="en-US"/>
           </a:p>
@@ -1613,7 +2282,7 @@
           <a:p>
             <a:fld id="{E71A4870-E222-4CD6-881F-7AD8134D3EF7}" type="datetimeFigureOut">
               <a:rPr lang="en-US" smtClean="0"/>
-              <a:t>8/19/2021</a:t>
+              <a:t>10/1/2021</a:t>
             </a:fld>
             <a:endParaRPr lang="en-US"/>
           </a:p>
@@ -1731,7 +2400,7 @@
           <a:p>
             <a:fld id="{E71A4870-E222-4CD6-881F-7AD8134D3EF7}" type="datetimeFigureOut">
               <a:rPr lang="en-US" smtClean="0"/>
-              <a:t>8/19/2021</a:t>
+              <a:t>10/1/2021</a:t>
             </a:fld>
             <a:endParaRPr lang="en-US"/>
           </a:p>
@@ -1826,7 +2495,7 @@
           <a:p>
             <a:fld id="{E71A4870-E222-4CD6-881F-7AD8134D3EF7}" type="datetimeFigureOut">
               <a:rPr lang="en-US" smtClean="0"/>
-              <a:t>8/19/2021</a:t>
+              <a:t>10/1/2021</a:t>
             </a:fld>
             <a:endParaRPr lang="en-US"/>
           </a:p>
@@ -2103,7 +2772,7 @@
           <a:p>
             <a:fld id="{E71A4870-E222-4CD6-881F-7AD8134D3EF7}" type="datetimeFigureOut">
               <a:rPr lang="en-US" smtClean="0"/>
-              <a:t>8/19/2021</a:t>
+              <a:t>10/1/2021</a:t>
             </a:fld>
             <a:endParaRPr lang="en-US"/>
           </a:p>
@@ -2360,7 +3029,7 @@
           <a:p>
             <a:fld id="{E71A4870-E222-4CD6-881F-7AD8134D3EF7}" type="datetimeFigureOut">
               <a:rPr lang="en-US" smtClean="0"/>
-              <a:t>8/19/2021</a:t>
+              <a:t>10/1/2021</a:t>
             </a:fld>
             <a:endParaRPr lang="en-US"/>
           </a:p>
@@ -2573,7 +3242,7 @@
           <a:p>
             <a:fld id="{E71A4870-E222-4CD6-881F-7AD8134D3EF7}" type="datetimeFigureOut">
               <a:rPr lang="en-US" smtClean="0"/>
-              <a:t>8/19/2021</a:t>
+              <a:t>10/1/2021</a:t>
             </a:fld>
             <a:endParaRPr lang="en-US"/>
           </a:p>
@@ -3359,7 +4028,7 @@
         <p:spPr>
           <a:xfrm>
             <a:off x="838200" y="1825625"/>
-            <a:ext cx="6096556" cy="4351338"/>
+            <a:ext cx="5553075" cy="4351338"/>
           </a:xfrm>
         </p:spPr>
         <p:txBody>
@@ -3380,17 +4049,221 @@
           <a:p>
             <a:r>
               <a:rPr lang="en-US" dirty="0"/>
-              <a:t>However, tools to visualize ones progress are lacking.</a:t>
-            </a:r>
+              <a:t>However, tools to visualize group/individuals progress are lacking.</a:t>
+            </a:r>
+          </a:p>
+        </p:txBody>
+      </p:sp>
+      <p:sp>
+        <p:nvSpPr>
+          <p:cNvPr id="7" name="Content Placeholder 2">
+            <a:extLst>
+              <a:ext uri="{FF2B5EF4-FFF2-40B4-BE49-F238E27FC236}">
+                <a16:creationId xmlns:a16="http://schemas.microsoft.com/office/drawing/2014/main" id="{A854C767-09CF-4F8A-B9BF-985C1CB0CF75}"/>
+              </a:ext>
+            </a:extLst>
+          </p:cNvPr>
+          <p:cNvSpPr txBox="1">
+            <a:spLocks/>
+          </p:cNvSpPr>
+          <p:nvPr/>
+        </p:nvSpPr>
+        <p:spPr>
+          <a:xfrm>
+            <a:off x="9174692" y="6176963"/>
+            <a:ext cx="2754086" cy="558140"/>
+          </a:xfrm>
+          <a:prstGeom prst="rect">
+            <a:avLst/>
+          </a:prstGeom>
+        </p:spPr>
+        <p:txBody>
+          <a:bodyPr vert="horz" lIns="91440" tIns="45720" rIns="91440" bIns="45720" rtlCol="0">
+            <a:normAutofit/>
+          </a:bodyPr>
+          <a:lstStyle>
+            <a:lvl1pPr marL="228600" indent="-228600" algn="l" defTabSz="914400" rtl="0" eaLnBrk="1" latinLnBrk="0" hangingPunct="1">
+              <a:lnSpc>
+                <a:spcPct val="90000"/>
+              </a:lnSpc>
+              <a:spcBef>
+                <a:spcPts val="1000"/>
+              </a:spcBef>
+              <a:buFont typeface="Arial" panose="020B0604020202020204" pitchFamily="34" charset="0"/>
+              <a:buChar char="•"/>
+              <a:defRPr sz="2800" kern="1200">
+                <a:solidFill>
+                  <a:schemeClr val="tx1"/>
+                </a:solidFill>
+                <a:latin typeface="+mn-lt"/>
+                <a:ea typeface="+mn-ea"/>
+                <a:cs typeface="+mn-cs"/>
+              </a:defRPr>
+            </a:lvl1pPr>
+            <a:lvl2pPr marL="685800" indent="-228600" algn="l" defTabSz="914400" rtl="0" eaLnBrk="1" latinLnBrk="0" hangingPunct="1">
+              <a:lnSpc>
+                <a:spcPct val="90000"/>
+              </a:lnSpc>
+              <a:spcBef>
+                <a:spcPts val="500"/>
+              </a:spcBef>
+              <a:buFont typeface="Arial" panose="020B0604020202020204" pitchFamily="34" charset="0"/>
+              <a:buChar char="•"/>
+              <a:defRPr sz="2400" kern="1200">
+                <a:solidFill>
+                  <a:schemeClr val="tx1"/>
+                </a:solidFill>
+                <a:latin typeface="+mn-lt"/>
+                <a:ea typeface="+mn-ea"/>
+                <a:cs typeface="+mn-cs"/>
+              </a:defRPr>
+            </a:lvl2pPr>
+            <a:lvl3pPr marL="1143000" indent="-228600" algn="l" defTabSz="914400" rtl="0" eaLnBrk="1" latinLnBrk="0" hangingPunct="1">
+              <a:lnSpc>
+                <a:spcPct val="90000"/>
+              </a:lnSpc>
+              <a:spcBef>
+                <a:spcPts val="500"/>
+              </a:spcBef>
+              <a:buFont typeface="Arial" panose="020B0604020202020204" pitchFamily="34" charset="0"/>
+              <a:buChar char="•"/>
+              <a:defRPr sz="2000" kern="1200">
+                <a:solidFill>
+                  <a:schemeClr val="tx1"/>
+                </a:solidFill>
+                <a:latin typeface="+mn-lt"/>
+                <a:ea typeface="+mn-ea"/>
+                <a:cs typeface="+mn-cs"/>
+              </a:defRPr>
+            </a:lvl3pPr>
+            <a:lvl4pPr marL="1600200" indent="-228600" algn="l" defTabSz="914400" rtl="0" eaLnBrk="1" latinLnBrk="0" hangingPunct="1">
+              <a:lnSpc>
+                <a:spcPct val="90000"/>
+              </a:lnSpc>
+              <a:spcBef>
+                <a:spcPts val="500"/>
+              </a:spcBef>
+              <a:buFont typeface="Arial" panose="020B0604020202020204" pitchFamily="34" charset="0"/>
+              <a:buChar char="•"/>
+              <a:defRPr sz="1800" kern="1200">
+                <a:solidFill>
+                  <a:schemeClr val="tx1"/>
+                </a:solidFill>
+                <a:latin typeface="+mn-lt"/>
+                <a:ea typeface="+mn-ea"/>
+                <a:cs typeface="+mn-cs"/>
+              </a:defRPr>
+            </a:lvl4pPr>
+            <a:lvl5pPr marL="2057400" indent="-228600" algn="l" defTabSz="914400" rtl="0" eaLnBrk="1" latinLnBrk="0" hangingPunct="1">
+              <a:lnSpc>
+                <a:spcPct val="90000"/>
+              </a:lnSpc>
+              <a:spcBef>
+                <a:spcPts val="500"/>
+              </a:spcBef>
+              <a:buFont typeface="Arial" panose="020B0604020202020204" pitchFamily="34" charset="0"/>
+              <a:buChar char="•"/>
+              <a:defRPr sz="1800" kern="1200">
+                <a:solidFill>
+                  <a:schemeClr val="tx1"/>
+                </a:solidFill>
+                <a:latin typeface="+mn-lt"/>
+                <a:ea typeface="+mn-ea"/>
+                <a:cs typeface="+mn-cs"/>
+              </a:defRPr>
+            </a:lvl5pPr>
+            <a:lvl6pPr marL="2514600" indent="-228600" algn="l" defTabSz="914400" rtl="0" eaLnBrk="1" latinLnBrk="0" hangingPunct="1">
+              <a:lnSpc>
+                <a:spcPct val="90000"/>
+              </a:lnSpc>
+              <a:spcBef>
+                <a:spcPts val="500"/>
+              </a:spcBef>
+              <a:buFont typeface="Arial" panose="020B0604020202020204" pitchFamily="34" charset="0"/>
+              <a:buChar char="•"/>
+              <a:defRPr sz="1800" kern="1200">
+                <a:solidFill>
+                  <a:schemeClr val="tx1"/>
+                </a:solidFill>
+                <a:latin typeface="+mn-lt"/>
+                <a:ea typeface="+mn-ea"/>
+                <a:cs typeface="+mn-cs"/>
+              </a:defRPr>
+            </a:lvl6pPr>
+            <a:lvl7pPr marL="2971800" indent="-228600" algn="l" defTabSz="914400" rtl="0" eaLnBrk="1" latinLnBrk="0" hangingPunct="1">
+              <a:lnSpc>
+                <a:spcPct val="90000"/>
+              </a:lnSpc>
+              <a:spcBef>
+                <a:spcPts val="500"/>
+              </a:spcBef>
+              <a:buFont typeface="Arial" panose="020B0604020202020204" pitchFamily="34" charset="0"/>
+              <a:buChar char="•"/>
+              <a:defRPr sz="1800" kern="1200">
+                <a:solidFill>
+                  <a:schemeClr val="tx1"/>
+                </a:solidFill>
+                <a:latin typeface="+mn-lt"/>
+                <a:ea typeface="+mn-ea"/>
+                <a:cs typeface="+mn-cs"/>
+              </a:defRPr>
+            </a:lvl7pPr>
+            <a:lvl8pPr marL="3429000" indent="-228600" algn="l" defTabSz="914400" rtl="0" eaLnBrk="1" latinLnBrk="0" hangingPunct="1">
+              <a:lnSpc>
+                <a:spcPct val="90000"/>
+              </a:lnSpc>
+              <a:spcBef>
+                <a:spcPts val="500"/>
+              </a:spcBef>
+              <a:buFont typeface="Arial" panose="020B0604020202020204" pitchFamily="34" charset="0"/>
+              <a:buChar char="•"/>
+              <a:defRPr sz="1800" kern="1200">
+                <a:solidFill>
+                  <a:schemeClr val="tx1"/>
+                </a:solidFill>
+                <a:latin typeface="+mn-lt"/>
+                <a:ea typeface="+mn-ea"/>
+                <a:cs typeface="+mn-cs"/>
+              </a:defRPr>
+            </a:lvl8pPr>
+            <a:lvl9pPr marL="3886200" indent="-228600" algn="l" defTabSz="914400" rtl="0" eaLnBrk="1" latinLnBrk="0" hangingPunct="1">
+              <a:lnSpc>
+                <a:spcPct val="90000"/>
+              </a:lnSpc>
+              <a:spcBef>
+                <a:spcPts val="500"/>
+              </a:spcBef>
+              <a:buFont typeface="Arial" panose="020B0604020202020204" pitchFamily="34" charset="0"/>
+              <a:buChar char="•"/>
+              <a:defRPr sz="1800" kern="1200">
+                <a:solidFill>
+                  <a:schemeClr val="tx1"/>
+                </a:solidFill>
+                <a:latin typeface="+mn-lt"/>
+                <a:ea typeface="+mn-ea"/>
+                <a:cs typeface="+mn-cs"/>
+              </a:defRPr>
+            </a:lvl9pPr>
+          </a:lstStyle>
+          <a:p>
+            <a:pPr marL="0" indent="0">
+              <a:buFont typeface="Arial" panose="020B0604020202020204" pitchFamily="34" charset="0"/>
+              <a:buNone/>
+            </a:pPr>
+            <a:r>
+              <a:rPr lang="en-US"/>
+              <a:t>Garrick Bruening</a:t>
+            </a:r>
+            <a:endParaRPr lang="en-US" dirty="0"/>
           </a:p>
         </p:txBody>
       </p:sp>
       <p:pic>
         <p:nvPicPr>
-          <p:cNvPr id="6" name="Picture 5" descr="A screenshot of a computer&#10;&#10;Description automatically generated">
+          <p:cNvPr id="5" name="Picture 4" descr="A screenshot of a computer&#10;&#10;Description automatically generated with medium confidence">
             <a:extLst>
               <a:ext uri="{FF2B5EF4-FFF2-40B4-BE49-F238E27FC236}">
-                <a16:creationId xmlns:a16="http://schemas.microsoft.com/office/drawing/2014/main" id="{018ECE03-360E-4AF4-B98D-0ECF64C10257}"/>
+                <a16:creationId xmlns:a16="http://schemas.microsoft.com/office/drawing/2014/main" id="{38ED7E48-B608-4479-9A86-67D23911F854}"/>
               </a:ext>
             </a:extLst>
           </p:cNvPr>
@@ -3400,225 +4273,27 @@
           <p:nvPr/>
         </p:nvPicPr>
         <p:blipFill>
-          <a:blip r:embed="rId2"/>
+          <a:blip r:embed="rId3">
+            <a:extLst>
+              <a:ext uri="{28A0092B-C50C-407E-A947-70E740481C1C}">
+                <a14:useLocalDpi xmlns:a14="http://schemas.microsoft.com/office/drawing/2010/main" val="0"/>
+              </a:ext>
+            </a:extLst>
+          </a:blip>
           <a:stretch>
             <a:fillRect/>
           </a:stretch>
         </p:blipFill>
         <p:spPr>
           <a:xfrm>
-            <a:off x="7085728" y="2910959"/>
-            <a:ext cx="4843050" cy="1325563"/>
+            <a:off x="6336242" y="2005593"/>
+            <a:ext cx="5676900" cy="2846813"/>
           </a:xfrm>
           <a:prstGeom prst="rect">
             <a:avLst/>
           </a:prstGeom>
         </p:spPr>
       </p:pic>
-      <p:sp>
-        <p:nvSpPr>
-          <p:cNvPr id="7" name="Content Placeholder 2">
-            <a:extLst>
-              <a:ext uri="{FF2B5EF4-FFF2-40B4-BE49-F238E27FC236}">
-                <a16:creationId xmlns:a16="http://schemas.microsoft.com/office/drawing/2014/main" id="{A854C767-09CF-4F8A-B9BF-985C1CB0CF75}"/>
-              </a:ext>
-            </a:extLst>
-          </p:cNvPr>
-          <p:cNvSpPr txBox="1">
-            <a:spLocks/>
-          </p:cNvSpPr>
-          <p:nvPr/>
-        </p:nvSpPr>
-        <p:spPr>
-          <a:xfrm>
-            <a:off x="9174692" y="6176963"/>
-            <a:ext cx="2754086" cy="558140"/>
-          </a:xfrm>
-          <a:prstGeom prst="rect">
-            <a:avLst/>
-          </a:prstGeom>
-        </p:spPr>
-        <p:txBody>
-          <a:bodyPr vert="horz" lIns="91440" tIns="45720" rIns="91440" bIns="45720" rtlCol="0">
-            <a:normAutofit/>
-          </a:bodyPr>
-          <a:lstStyle>
-            <a:lvl1pPr marL="228600" indent="-228600" algn="l" defTabSz="914400" rtl="0" eaLnBrk="1" latinLnBrk="0" hangingPunct="1">
-              <a:lnSpc>
-                <a:spcPct val="90000"/>
-              </a:lnSpc>
-              <a:spcBef>
-                <a:spcPts val="1000"/>
-              </a:spcBef>
-              <a:buFont typeface="Arial" panose="020B0604020202020204" pitchFamily="34" charset="0"/>
-              <a:buChar char="•"/>
-              <a:defRPr sz="2800" kern="1200">
-                <a:solidFill>
-                  <a:schemeClr val="tx1"/>
-                </a:solidFill>
-                <a:latin typeface="+mn-lt"/>
-                <a:ea typeface="+mn-ea"/>
-                <a:cs typeface="+mn-cs"/>
-              </a:defRPr>
-            </a:lvl1pPr>
-            <a:lvl2pPr marL="685800" indent="-228600" algn="l" defTabSz="914400" rtl="0" eaLnBrk="1" latinLnBrk="0" hangingPunct="1">
-              <a:lnSpc>
-                <a:spcPct val="90000"/>
-              </a:lnSpc>
-              <a:spcBef>
-                <a:spcPts val="500"/>
-              </a:spcBef>
-              <a:buFont typeface="Arial" panose="020B0604020202020204" pitchFamily="34" charset="0"/>
-              <a:buChar char="•"/>
-              <a:defRPr sz="2400" kern="1200">
-                <a:solidFill>
-                  <a:schemeClr val="tx1"/>
-                </a:solidFill>
-                <a:latin typeface="+mn-lt"/>
-                <a:ea typeface="+mn-ea"/>
-                <a:cs typeface="+mn-cs"/>
-              </a:defRPr>
-            </a:lvl2pPr>
-            <a:lvl3pPr marL="1143000" indent="-228600" algn="l" defTabSz="914400" rtl="0" eaLnBrk="1" latinLnBrk="0" hangingPunct="1">
-              <a:lnSpc>
-                <a:spcPct val="90000"/>
-              </a:lnSpc>
-              <a:spcBef>
-                <a:spcPts val="500"/>
-              </a:spcBef>
-              <a:buFont typeface="Arial" panose="020B0604020202020204" pitchFamily="34" charset="0"/>
-              <a:buChar char="•"/>
-              <a:defRPr sz="2000" kern="1200">
-                <a:solidFill>
-                  <a:schemeClr val="tx1"/>
-                </a:solidFill>
-                <a:latin typeface="+mn-lt"/>
-                <a:ea typeface="+mn-ea"/>
-                <a:cs typeface="+mn-cs"/>
-              </a:defRPr>
-            </a:lvl3pPr>
-            <a:lvl4pPr marL="1600200" indent="-228600" algn="l" defTabSz="914400" rtl="0" eaLnBrk="1" latinLnBrk="0" hangingPunct="1">
-              <a:lnSpc>
-                <a:spcPct val="90000"/>
-              </a:lnSpc>
-              <a:spcBef>
-                <a:spcPts val="500"/>
-              </a:spcBef>
-              <a:buFont typeface="Arial" panose="020B0604020202020204" pitchFamily="34" charset="0"/>
-              <a:buChar char="•"/>
-              <a:defRPr sz="1800" kern="1200">
-                <a:solidFill>
-                  <a:schemeClr val="tx1"/>
-                </a:solidFill>
-                <a:latin typeface="+mn-lt"/>
-                <a:ea typeface="+mn-ea"/>
-                <a:cs typeface="+mn-cs"/>
-              </a:defRPr>
-            </a:lvl4pPr>
-            <a:lvl5pPr marL="2057400" indent="-228600" algn="l" defTabSz="914400" rtl="0" eaLnBrk="1" latinLnBrk="0" hangingPunct="1">
-              <a:lnSpc>
-                <a:spcPct val="90000"/>
-              </a:lnSpc>
-              <a:spcBef>
-                <a:spcPts val="500"/>
-              </a:spcBef>
-              <a:buFont typeface="Arial" panose="020B0604020202020204" pitchFamily="34" charset="0"/>
-              <a:buChar char="•"/>
-              <a:defRPr sz="1800" kern="1200">
-                <a:solidFill>
-                  <a:schemeClr val="tx1"/>
-                </a:solidFill>
-                <a:latin typeface="+mn-lt"/>
-                <a:ea typeface="+mn-ea"/>
-                <a:cs typeface="+mn-cs"/>
-              </a:defRPr>
-            </a:lvl5pPr>
-            <a:lvl6pPr marL="2514600" indent="-228600" algn="l" defTabSz="914400" rtl="0" eaLnBrk="1" latinLnBrk="0" hangingPunct="1">
-              <a:lnSpc>
-                <a:spcPct val="90000"/>
-              </a:lnSpc>
-              <a:spcBef>
-                <a:spcPts val="500"/>
-              </a:spcBef>
-              <a:buFont typeface="Arial" panose="020B0604020202020204" pitchFamily="34" charset="0"/>
-              <a:buChar char="•"/>
-              <a:defRPr sz="1800" kern="1200">
-                <a:solidFill>
-                  <a:schemeClr val="tx1"/>
-                </a:solidFill>
-                <a:latin typeface="+mn-lt"/>
-                <a:ea typeface="+mn-ea"/>
-                <a:cs typeface="+mn-cs"/>
-              </a:defRPr>
-            </a:lvl6pPr>
-            <a:lvl7pPr marL="2971800" indent="-228600" algn="l" defTabSz="914400" rtl="0" eaLnBrk="1" latinLnBrk="0" hangingPunct="1">
-              <a:lnSpc>
-                <a:spcPct val="90000"/>
-              </a:lnSpc>
-              <a:spcBef>
-                <a:spcPts val="500"/>
-              </a:spcBef>
-              <a:buFont typeface="Arial" panose="020B0604020202020204" pitchFamily="34" charset="0"/>
-              <a:buChar char="•"/>
-              <a:defRPr sz="1800" kern="1200">
-                <a:solidFill>
-                  <a:schemeClr val="tx1"/>
-                </a:solidFill>
-                <a:latin typeface="+mn-lt"/>
-                <a:ea typeface="+mn-ea"/>
-                <a:cs typeface="+mn-cs"/>
-              </a:defRPr>
-            </a:lvl7pPr>
-            <a:lvl8pPr marL="3429000" indent="-228600" algn="l" defTabSz="914400" rtl="0" eaLnBrk="1" latinLnBrk="0" hangingPunct="1">
-              <a:lnSpc>
-                <a:spcPct val="90000"/>
-              </a:lnSpc>
-              <a:spcBef>
-                <a:spcPts val="500"/>
-              </a:spcBef>
-              <a:buFont typeface="Arial" panose="020B0604020202020204" pitchFamily="34" charset="0"/>
-              <a:buChar char="•"/>
-              <a:defRPr sz="1800" kern="1200">
-                <a:solidFill>
-                  <a:schemeClr val="tx1"/>
-                </a:solidFill>
-                <a:latin typeface="+mn-lt"/>
-                <a:ea typeface="+mn-ea"/>
-                <a:cs typeface="+mn-cs"/>
-              </a:defRPr>
-            </a:lvl8pPr>
-            <a:lvl9pPr marL="3886200" indent="-228600" algn="l" defTabSz="914400" rtl="0" eaLnBrk="1" latinLnBrk="0" hangingPunct="1">
-              <a:lnSpc>
-                <a:spcPct val="90000"/>
-              </a:lnSpc>
-              <a:spcBef>
-                <a:spcPts val="500"/>
-              </a:spcBef>
-              <a:buFont typeface="Arial" panose="020B0604020202020204" pitchFamily="34" charset="0"/>
-              <a:buChar char="•"/>
-              <a:defRPr sz="1800" kern="1200">
-                <a:solidFill>
-                  <a:schemeClr val="tx1"/>
-                </a:solidFill>
-                <a:latin typeface="+mn-lt"/>
-                <a:ea typeface="+mn-ea"/>
-                <a:cs typeface="+mn-cs"/>
-              </a:defRPr>
-            </a:lvl9pPr>
-          </a:lstStyle>
-          <a:p>
-            <a:pPr marL="0" indent="0">
-              <a:buFont typeface="Arial" panose="020B0604020202020204" pitchFamily="34" charset="0"/>
-              <a:buNone/>
-            </a:pPr>
-            <a:r>
-              <a:rPr lang="en-US"/>
-              <a:t>Garrick Bruening</a:t>
-            </a:r>
-            <a:endParaRPr lang="en-US" dirty="0"/>
-          </a:p>
-        </p:txBody>
-      </p:sp>
     </p:spTree>
     <p:extLst>
       <p:ext uri="{BB962C8B-B14F-4D97-AF65-F5344CB8AC3E}">
@@ -3701,7 +4376,7 @@
         <p:spPr>
           <a:xfrm>
             <a:off x="838200" y="1825625"/>
-            <a:ext cx="6096556" cy="4351338"/>
+            <a:ext cx="4095750" cy="4351338"/>
           </a:xfrm>
         </p:spPr>
         <p:txBody>
@@ -3724,41 +4399,6 @@
           </a:p>
         </p:txBody>
       </p:sp>
-      <p:pic>
-        <p:nvPicPr>
-          <p:cNvPr id="4" name="Picture 3" descr="Graphical user interface&#10;&#10;Description automatically generated">
-            <a:extLst>
-              <a:ext uri="{FF2B5EF4-FFF2-40B4-BE49-F238E27FC236}">
-                <a16:creationId xmlns:a16="http://schemas.microsoft.com/office/drawing/2014/main" id="{1AC4BB20-EB52-4C43-ACA9-E93FB8BFF940}"/>
-              </a:ext>
-            </a:extLst>
-          </p:cNvPr>
-          <p:cNvPicPr>
-            <a:picLocks noChangeAspect="1"/>
-          </p:cNvPicPr>
-          <p:nvPr/>
-        </p:nvPicPr>
-        <p:blipFill rotWithShape="1">
-          <a:blip r:embed="rId2">
-            <a:extLst>
-              <a:ext uri="{28A0092B-C50C-407E-A947-70E740481C1C}">
-                <a14:useLocalDpi xmlns:a14="http://schemas.microsoft.com/office/drawing/2010/main" val="0"/>
-              </a:ext>
-            </a:extLst>
-          </a:blip>
-          <a:srcRect l="-472" t="36070" r="73077" b="31505"/>
-          <a:stretch/>
-        </p:blipFill>
-        <p:spPr>
-          <a:xfrm>
-            <a:off x="8191753" y="2683133"/>
-            <a:ext cx="2357865" cy="2076118"/>
-          </a:xfrm>
-          <a:prstGeom prst="rect">
-            <a:avLst/>
-          </a:prstGeom>
-        </p:spPr>
-      </p:pic>
       <p:sp>
         <p:nvSpPr>
           <p:cNvPr id="7" name="Content Placeholder 2">
@@ -3963,6 +4603,42 @@
           </a:p>
         </p:txBody>
       </p:sp>
+      <p:pic>
+        <p:nvPicPr>
+          <p:cNvPr id="8" name="Picture 7" descr="Graphical user interface&#10;&#10;Description automatically generated">
+            <a:extLst>
+              <a:ext uri="{FF2B5EF4-FFF2-40B4-BE49-F238E27FC236}">
+                <a16:creationId xmlns:a16="http://schemas.microsoft.com/office/drawing/2014/main" id="{A5D1095A-DC21-49A1-B520-3A051CF3385E}"/>
+              </a:ext>
+            </a:extLst>
+          </p:cNvPr>
+          <p:cNvPicPr>
+            <a:picLocks noChangeAspect="1"/>
+          </p:cNvPicPr>
+          <p:nvPr/>
+        </p:nvPicPr>
+        <p:blipFill>
+          <a:blip r:embed="rId2">
+            <a:extLst>
+              <a:ext uri="{28A0092B-C50C-407E-A947-70E740481C1C}">
+                <a14:useLocalDpi xmlns:a14="http://schemas.microsoft.com/office/drawing/2010/main" val="0"/>
+              </a:ext>
+            </a:extLst>
+          </a:blip>
+          <a:stretch>
+            <a:fillRect/>
+          </a:stretch>
+        </p:blipFill>
+        <p:spPr>
+          <a:xfrm>
+            <a:off x="5181252" y="1117308"/>
+            <a:ext cx="6635889" cy="4890436"/>
+          </a:xfrm>
+          <a:prstGeom prst="rect">
+            <a:avLst/>
+          </a:prstGeom>
+        </p:spPr>
+      </p:pic>
     </p:spTree>
     <p:extLst>
       <p:ext uri="{BB962C8B-B14F-4D97-AF65-F5344CB8AC3E}">
@@ -3993,12 +4669,703 @@
           <a:chExt cx="0" cy="0"/>
         </a:xfrm>
       </p:grpSpPr>
+      <p:sp>
+        <p:nvSpPr>
+          <p:cNvPr id="6" name="Title 1">
+            <a:extLst>
+              <a:ext uri="{FF2B5EF4-FFF2-40B4-BE49-F238E27FC236}">
+                <a16:creationId xmlns:a16="http://schemas.microsoft.com/office/drawing/2014/main" id="{640DE1D3-36F2-4648-AF90-7621DE8D5A7A}"/>
+              </a:ext>
+            </a:extLst>
+          </p:cNvPr>
+          <p:cNvSpPr txBox="1">
+            <a:spLocks/>
+          </p:cNvSpPr>
+          <p:nvPr/>
+        </p:nvSpPr>
+        <p:spPr>
+          <a:xfrm>
+            <a:off x="468365" y="244766"/>
+            <a:ext cx="6025877" cy="872542"/>
+          </a:xfrm>
+          <a:prstGeom prst="rect">
+            <a:avLst/>
+          </a:prstGeom>
+        </p:spPr>
+        <p:txBody>
+          <a:bodyPr vert="horz" lIns="91440" tIns="45720" rIns="91440" bIns="45720" rtlCol="0" anchor="b">
+            <a:normAutofit fontScale="85000" lnSpcReduction="10000"/>
+          </a:bodyPr>
+          <a:lstStyle>
+            <a:lvl1pPr algn="ctr" defTabSz="914400" rtl="0" eaLnBrk="1" latinLnBrk="0" hangingPunct="1">
+              <a:lnSpc>
+                <a:spcPct val="90000"/>
+              </a:lnSpc>
+              <a:spcBef>
+                <a:spcPct val="0"/>
+              </a:spcBef>
+              <a:buNone/>
+              <a:defRPr sz="6000" kern="1200">
+                <a:solidFill>
+                  <a:schemeClr val="tx1"/>
+                </a:solidFill>
+                <a:latin typeface="+mj-lt"/>
+                <a:ea typeface="+mj-ea"/>
+                <a:cs typeface="+mj-cs"/>
+              </a:defRPr>
+            </a:lvl1pPr>
+          </a:lstStyle>
+          <a:p>
+            <a:pPr algn="l"/>
+            <a:r>
+              <a:rPr lang="en-US" dirty="0">
+                <a:solidFill>
+                  <a:srgbClr val="FFCC00"/>
+                </a:solidFill>
+                <a:latin typeface="+mn-lt"/>
+              </a:rPr>
+              <a:t>Individual group data</a:t>
+            </a:r>
+          </a:p>
+        </p:txBody>
+      </p:sp>
+      <p:sp>
+        <p:nvSpPr>
+          <p:cNvPr id="7" name="Content Placeholder 2">
+            <a:extLst>
+              <a:ext uri="{FF2B5EF4-FFF2-40B4-BE49-F238E27FC236}">
+                <a16:creationId xmlns:a16="http://schemas.microsoft.com/office/drawing/2014/main" id="{D713D7AB-A025-4DB6-B232-FF4B7E9D2EDF}"/>
+              </a:ext>
+            </a:extLst>
+          </p:cNvPr>
+          <p:cNvSpPr txBox="1">
+            <a:spLocks/>
+          </p:cNvSpPr>
+          <p:nvPr/>
+        </p:nvSpPr>
+        <p:spPr>
+          <a:xfrm>
+            <a:off x="838200" y="1825625"/>
+            <a:ext cx="6443628" cy="4351338"/>
+          </a:xfrm>
+          <a:prstGeom prst="rect">
+            <a:avLst/>
+          </a:prstGeom>
+        </p:spPr>
+        <p:txBody>
+          <a:bodyPr vert="horz" lIns="91440" tIns="45720" rIns="91440" bIns="45720" rtlCol="0">
+            <a:normAutofit/>
+          </a:bodyPr>
+          <a:lstStyle>
+            <a:lvl1pPr marL="0" indent="0" algn="ctr" defTabSz="914400" rtl="0" eaLnBrk="1" latinLnBrk="0" hangingPunct="1">
+              <a:lnSpc>
+                <a:spcPct val="90000"/>
+              </a:lnSpc>
+              <a:spcBef>
+                <a:spcPts val="1000"/>
+              </a:spcBef>
+              <a:buFont typeface="Arial" panose="020B0604020202020204" pitchFamily="34" charset="0"/>
+              <a:buNone/>
+              <a:defRPr sz="2400" kern="1200">
+                <a:solidFill>
+                  <a:schemeClr val="tx1"/>
+                </a:solidFill>
+                <a:latin typeface="+mn-lt"/>
+                <a:ea typeface="+mn-ea"/>
+                <a:cs typeface="+mn-cs"/>
+              </a:defRPr>
+            </a:lvl1pPr>
+            <a:lvl2pPr marL="457200" indent="0" algn="ctr" defTabSz="914400" rtl="0" eaLnBrk="1" latinLnBrk="0" hangingPunct="1">
+              <a:lnSpc>
+                <a:spcPct val="90000"/>
+              </a:lnSpc>
+              <a:spcBef>
+                <a:spcPts val="500"/>
+              </a:spcBef>
+              <a:buFont typeface="Arial" panose="020B0604020202020204" pitchFamily="34" charset="0"/>
+              <a:buNone/>
+              <a:defRPr sz="2000" kern="1200">
+                <a:solidFill>
+                  <a:schemeClr val="tx1"/>
+                </a:solidFill>
+                <a:latin typeface="+mn-lt"/>
+                <a:ea typeface="+mn-ea"/>
+                <a:cs typeface="+mn-cs"/>
+              </a:defRPr>
+            </a:lvl2pPr>
+            <a:lvl3pPr marL="914400" indent="0" algn="ctr" defTabSz="914400" rtl="0" eaLnBrk="1" latinLnBrk="0" hangingPunct="1">
+              <a:lnSpc>
+                <a:spcPct val="90000"/>
+              </a:lnSpc>
+              <a:spcBef>
+                <a:spcPts val="500"/>
+              </a:spcBef>
+              <a:buFont typeface="Arial" panose="020B0604020202020204" pitchFamily="34" charset="0"/>
+              <a:buNone/>
+              <a:defRPr sz="1800" kern="1200">
+                <a:solidFill>
+                  <a:schemeClr val="tx1"/>
+                </a:solidFill>
+                <a:latin typeface="+mn-lt"/>
+                <a:ea typeface="+mn-ea"/>
+                <a:cs typeface="+mn-cs"/>
+              </a:defRPr>
+            </a:lvl3pPr>
+            <a:lvl4pPr marL="1371600" indent="0" algn="ctr" defTabSz="914400" rtl="0" eaLnBrk="1" latinLnBrk="0" hangingPunct="1">
+              <a:lnSpc>
+                <a:spcPct val="90000"/>
+              </a:lnSpc>
+              <a:spcBef>
+                <a:spcPts val="500"/>
+              </a:spcBef>
+              <a:buFont typeface="Arial" panose="020B0604020202020204" pitchFamily="34" charset="0"/>
+              <a:buNone/>
+              <a:defRPr sz="1600" kern="1200">
+                <a:solidFill>
+                  <a:schemeClr val="tx1"/>
+                </a:solidFill>
+                <a:latin typeface="+mn-lt"/>
+                <a:ea typeface="+mn-ea"/>
+                <a:cs typeface="+mn-cs"/>
+              </a:defRPr>
+            </a:lvl4pPr>
+            <a:lvl5pPr marL="1828800" indent="0" algn="ctr" defTabSz="914400" rtl="0" eaLnBrk="1" latinLnBrk="0" hangingPunct="1">
+              <a:lnSpc>
+                <a:spcPct val="90000"/>
+              </a:lnSpc>
+              <a:spcBef>
+                <a:spcPts val="500"/>
+              </a:spcBef>
+              <a:buFont typeface="Arial" panose="020B0604020202020204" pitchFamily="34" charset="0"/>
+              <a:buNone/>
+              <a:defRPr sz="1600" kern="1200">
+                <a:solidFill>
+                  <a:schemeClr val="tx1"/>
+                </a:solidFill>
+                <a:latin typeface="+mn-lt"/>
+                <a:ea typeface="+mn-ea"/>
+                <a:cs typeface="+mn-cs"/>
+              </a:defRPr>
+            </a:lvl5pPr>
+            <a:lvl6pPr marL="2286000" indent="0" algn="ctr" defTabSz="914400" rtl="0" eaLnBrk="1" latinLnBrk="0" hangingPunct="1">
+              <a:lnSpc>
+                <a:spcPct val="90000"/>
+              </a:lnSpc>
+              <a:spcBef>
+                <a:spcPts val="500"/>
+              </a:spcBef>
+              <a:buFont typeface="Arial" panose="020B0604020202020204" pitchFamily="34" charset="0"/>
+              <a:buNone/>
+              <a:defRPr sz="1600" kern="1200">
+                <a:solidFill>
+                  <a:schemeClr val="tx1"/>
+                </a:solidFill>
+                <a:latin typeface="+mn-lt"/>
+                <a:ea typeface="+mn-ea"/>
+                <a:cs typeface="+mn-cs"/>
+              </a:defRPr>
+            </a:lvl6pPr>
+            <a:lvl7pPr marL="2743200" indent="0" algn="ctr" defTabSz="914400" rtl="0" eaLnBrk="1" latinLnBrk="0" hangingPunct="1">
+              <a:lnSpc>
+                <a:spcPct val="90000"/>
+              </a:lnSpc>
+              <a:spcBef>
+                <a:spcPts val="500"/>
+              </a:spcBef>
+              <a:buFont typeface="Arial" panose="020B0604020202020204" pitchFamily="34" charset="0"/>
+              <a:buNone/>
+              <a:defRPr sz="1600" kern="1200">
+                <a:solidFill>
+                  <a:schemeClr val="tx1"/>
+                </a:solidFill>
+                <a:latin typeface="+mn-lt"/>
+                <a:ea typeface="+mn-ea"/>
+                <a:cs typeface="+mn-cs"/>
+              </a:defRPr>
+            </a:lvl7pPr>
+            <a:lvl8pPr marL="3200400" indent="0" algn="ctr" defTabSz="914400" rtl="0" eaLnBrk="1" latinLnBrk="0" hangingPunct="1">
+              <a:lnSpc>
+                <a:spcPct val="90000"/>
+              </a:lnSpc>
+              <a:spcBef>
+                <a:spcPts val="500"/>
+              </a:spcBef>
+              <a:buFont typeface="Arial" panose="020B0604020202020204" pitchFamily="34" charset="0"/>
+              <a:buNone/>
+              <a:defRPr sz="1600" kern="1200">
+                <a:solidFill>
+                  <a:schemeClr val="tx1"/>
+                </a:solidFill>
+                <a:latin typeface="+mn-lt"/>
+                <a:ea typeface="+mn-ea"/>
+                <a:cs typeface="+mn-cs"/>
+              </a:defRPr>
+            </a:lvl8pPr>
+            <a:lvl9pPr marL="3657600" indent="0" algn="ctr" defTabSz="914400" rtl="0" eaLnBrk="1" latinLnBrk="0" hangingPunct="1">
+              <a:lnSpc>
+                <a:spcPct val="90000"/>
+              </a:lnSpc>
+              <a:spcBef>
+                <a:spcPts val="500"/>
+              </a:spcBef>
+              <a:buFont typeface="Arial" panose="020B0604020202020204" pitchFamily="34" charset="0"/>
+              <a:buNone/>
+              <a:defRPr sz="1600" kern="1200">
+                <a:solidFill>
+                  <a:schemeClr val="tx1"/>
+                </a:solidFill>
+                <a:latin typeface="+mn-lt"/>
+                <a:ea typeface="+mn-ea"/>
+                <a:cs typeface="+mn-cs"/>
+              </a:defRPr>
+            </a:lvl9pPr>
+          </a:lstStyle>
+          <a:p>
+            <a:endParaRPr lang="en-US" dirty="0"/>
+          </a:p>
+        </p:txBody>
+      </p:sp>
+      <p:sp>
+        <p:nvSpPr>
+          <p:cNvPr id="11" name="Content Placeholder 2">
+            <a:extLst>
+              <a:ext uri="{FF2B5EF4-FFF2-40B4-BE49-F238E27FC236}">
+                <a16:creationId xmlns:a16="http://schemas.microsoft.com/office/drawing/2014/main" id="{CAE7C721-240E-4E35-B61A-D4CB70AD2F45}"/>
+              </a:ext>
+            </a:extLst>
+          </p:cNvPr>
+          <p:cNvSpPr txBox="1">
+            <a:spLocks/>
+          </p:cNvSpPr>
+          <p:nvPr/>
+        </p:nvSpPr>
+        <p:spPr>
+          <a:xfrm>
+            <a:off x="838200" y="1717720"/>
+            <a:ext cx="3628121" cy="4282611"/>
+          </a:xfrm>
+          <a:prstGeom prst="rect">
+            <a:avLst/>
+          </a:prstGeom>
+        </p:spPr>
+        <p:txBody>
+          <a:bodyPr vert="horz" lIns="91440" tIns="45720" rIns="91440" bIns="45720" rtlCol="0">
+            <a:normAutofit/>
+          </a:bodyPr>
+          <a:lstStyle>
+            <a:lvl1pPr marL="0" indent="0" algn="ctr" defTabSz="914400" rtl="0" eaLnBrk="1" latinLnBrk="0" hangingPunct="1">
+              <a:lnSpc>
+                <a:spcPct val="90000"/>
+              </a:lnSpc>
+              <a:spcBef>
+                <a:spcPts val="1000"/>
+              </a:spcBef>
+              <a:buFont typeface="Arial" panose="020B0604020202020204" pitchFamily="34" charset="0"/>
+              <a:buNone/>
+              <a:defRPr sz="2400" kern="1200">
+                <a:solidFill>
+                  <a:schemeClr val="tx1"/>
+                </a:solidFill>
+                <a:latin typeface="+mn-lt"/>
+                <a:ea typeface="+mn-ea"/>
+                <a:cs typeface="+mn-cs"/>
+              </a:defRPr>
+            </a:lvl1pPr>
+            <a:lvl2pPr marL="457200" indent="0" algn="ctr" defTabSz="914400" rtl="0" eaLnBrk="1" latinLnBrk="0" hangingPunct="1">
+              <a:lnSpc>
+                <a:spcPct val="90000"/>
+              </a:lnSpc>
+              <a:spcBef>
+                <a:spcPts val="500"/>
+              </a:spcBef>
+              <a:buFont typeface="Arial" panose="020B0604020202020204" pitchFamily="34" charset="0"/>
+              <a:buNone/>
+              <a:defRPr sz="2000" kern="1200">
+                <a:solidFill>
+                  <a:schemeClr val="tx1"/>
+                </a:solidFill>
+                <a:latin typeface="+mn-lt"/>
+                <a:ea typeface="+mn-ea"/>
+                <a:cs typeface="+mn-cs"/>
+              </a:defRPr>
+            </a:lvl2pPr>
+            <a:lvl3pPr marL="914400" indent="0" algn="ctr" defTabSz="914400" rtl="0" eaLnBrk="1" latinLnBrk="0" hangingPunct="1">
+              <a:lnSpc>
+                <a:spcPct val="90000"/>
+              </a:lnSpc>
+              <a:spcBef>
+                <a:spcPts val="500"/>
+              </a:spcBef>
+              <a:buFont typeface="Arial" panose="020B0604020202020204" pitchFamily="34" charset="0"/>
+              <a:buNone/>
+              <a:defRPr sz="1800" kern="1200">
+                <a:solidFill>
+                  <a:schemeClr val="tx1"/>
+                </a:solidFill>
+                <a:latin typeface="+mn-lt"/>
+                <a:ea typeface="+mn-ea"/>
+                <a:cs typeface="+mn-cs"/>
+              </a:defRPr>
+            </a:lvl3pPr>
+            <a:lvl4pPr marL="1371600" indent="0" algn="ctr" defTabSz="914400" rtl="0" eaLnBrk="1" latinLnBrk="0" hangingPunct="1">
+              <a:lnSpc>
+                <a:spcPct val="90000"/>
+              </a:lnSpc>
+              <a:spcBef>
+                <a:spcPts val="500"/>
+              </a:spcBef>
+              <a:buFont typeface="Arial" panose="020B0604020202020204" pitchFamily="34" charset="0"/>
+              <a:buNone/>
+              <a:defRPr sz="1600" kern="1200">
+                <a:solidFill>
+                  <a:schemeClr val="tx1"/>
+                </a:solidFill>
+                <a:latin typeface="+mn-lt"/>
+                <a:ea typeface="+mn-ea"/>
+                <a:cs typeface="+mn-cs"/>
+              </a:defRPr>
+            </a:lvl4pPr>
+            <a:lvl5pPr marL="1828800" indent="0" algn="ctr" defTabSz="914400" rtl="0" eaLnBrk="1" latinLnBrk="0" hangingPunct="1">
+              <a:lnSpc>
+                <a:spcPct val="90000"/>
+              </a:lnSpc>
+              <a:spcBef>
+                <a:spcPts val="500"/>
+              </a:spcBef>
+              <a:buFont typeface="Arial" panose="020B0604020202020204" pitchFamily="34" charset="0"/>
+              <a:buNone/>
+              <a:defRPr sz="1600" kern="1200">
+                <a:solidFill>
+                  <a:schemeClr val="tx1"/>
+                </a:solidFill>
+                <a:latin typeface="+mn-lt"/>
+                <a:ea typeface="+mn-ea"/>
+                <a:cs typeface="+mn-cs"/>
+              </a:defRPr>
+            </a:lvl5pPr>
+            <a:lvl6pPr marL="2286000" indent="0" algn="ctr" defTabSz="914400" rtl="0" eaLnBrk="1" latinLnBrk="0" hangingPunct="1">
+              <a:lnSpc>
+                <a:spcPct val="90000"/>
+              </a:lnSpc>
+              <a:spcBef>
+                <a:spcPts val="500"/>
+              </a:spcBef>
+              <a:buFont typeface="Arial" panose="020B0604020202020204" pitchFamily="34" charset="0"/>
+              <a:buNone/>
+              <a:defRPr sz="1600" kern="1200">
+                <a:solidFill>
+                  <a:schemeClr val="tx1"/>
+                </a:solidFill>
+                <a:latin typeface="+mn-lt"/>
+                <a:ea typeface="+mn-ea"/>
+                <a:cs typeface="+mn-cs"/>
+              </a:defRPr>
+            </a:lvl6pPr>
+            <a:lvl7pPr marL="2743200" indent="0" algn="ctr" defTabSz="914400" rtl="0" eaLnBrk="1" latinLnBrk="0" hangingPunct="1">
+              <a:lnSpc>
+                <a:spcPct val="90000"/>
+              </a:lnSpc>
+              <a:spcBef>
+                <a:spcPts val="500"/>
+              </a:spcBef>
+              <a:buFont typeface="Arial" panose="020B0604020202020204" pitchFamily="34" charset="0"/>
+              <a:buNone/>
+              <a:defRPr sz="1600" kern="1200">
+                <a:solidFill>
+                  <a:schemeClr val="tx1"/>
+                </a:solidFill>
+                <a:latin typeface="+mn-lt"/>
+                <a:ea typeface="+mn-ea"/>
+                <a:cs typeface="+mn-cs"/>
+              </a:defRPr>
+            </a:lvl7pPr>
+            <a:lvl8pPr marL="3200400" indent="0" algn="ctr" defTabSz="914400" rtl="0" eaLnBrk="1" latinLnBrk="0" hangingPunct="1">
+              <a:lnSpc>
+                <a:spcPct val="90000"/>
+              </a:lnSpc>
+              <a:spcBef>
+                <a:spcPts val="500"/>
+              </a:spcBef>
+              <a:buFont typeface="Arial" panose="020B0604020202020204" pitchFamily="34" charset="0"/>
+              <a:buNone/>
+              <a:defRPr sz="1600" kern="1200">
+                <a:solidFill>
+                  <a:schemeClr val="tx1"/>
+                </a:solidFill>
+                <a:latin typeface="+mn-lt"/>
+                <a:ea typeface="+mn-ea"/>
+                <a:cs typeface="+mn-cs"/>
+              </a:defRPr>
+            </a:lvl8pPr>
+            <a:lvl9pPr marL="3657600" indent="0" algn="ctr" defTabSz="914400" rtl="0" eaLnBrk="1" latinLnBrk="0" hangingPunct="1">
+              <a:lnSpc>
+                <a:spcPct val="90000"/>
+              </a:lnSpc>
+              <a:spcBef>
+                <a:spcPts val="500"/>
+              </a:spcBef>
+              <a:buFont typeface="Arial" panose="020B0604020202020204" pitchFamily="34" charset="0"/>
+              <a:buNone/>
+              <a:defRPr sz="1600" kern="1200">
+                <a:solidFill>
+                  <a:schemeClr val="tx1"/>
+                </a:solidFill>
+                <a:latin typeface="+mn-lt"/>
+                <a:ea typeface="+mn-ea"/>
+                <a:cs typeface="+mn-cs"/>
+              </a:defRPr>
+            </a:lvl9pPr>
+          </a:lstStyle>
+          <a:p>
+            <a:pPr marL="342900" indent="-342900" algn="l">
+              <a:buFont typeface="Arial" panose="020B0604020202020204" pitchFamily="34" charset="0"/>
+              <a:buChar char="•"/>
+            </a:pPr>
+            <a:r>
+              <a:rPr lang="en-US" dirty="0"/>
+              <a:t>Data can be obtained through either web scraping or a website API.</a:t>
+            </a:r>
+          </a:p>
+          <a:p>
+            <a:pPr marL="342900" indent="-342900" algn="l">
+              <a:buFont typeface="Arial" panose="020B0604020202020204" pitchFamily="34" charset="0"/>
+              <a:buChar char="•"/>
+            </a:pPr>
+            <a:endParaRPr lang="en-US" dirty="0"/>
+          </a:p>
+          <a:p>
+            <a:pPr marL="342900" indent="-342900" algn="l">
+              <a:buFont typeface="Arial" panose="020B0604020202020204" pitchFamily="34" charset="0"/>
+              <a:buChar char="•"/>
+            </a:pPr>
+            <a:r>
+              <a:rPr lang="en-US" dirty="0"/>
+              <a:t>We can present each groups progression in easily understandable manner.</a:t>
+            </a:r>
+          </a:p>
+          <a:p>
+            <a:pPr algn="l"/>
+            <a:endParaRPr lang="en-US" dirty="0"/>
+          </a:p>
+          <a:p>
+            <a:pPr marL="342900" indent="-342900" algn="l">
+              <a:buFont typeface="Arial" panose="020B0604020202020204" pitchFamily="34" charset="0"/>
+              <a:buChar char="•"/>
+            </a:pPr>
+            <a:endParaRPr lang="en-US" dirty="0"/>
+          </a:p>
+        </p:txBody>
+      </p:sp>
+      <p:sp>
+        <p:nvSpPr>
+          <p:cNvPr id="8" name="Content Placeholder 2">
+            <a:extLst>
+              <a:ext uri="{FF2B5EF4-FFF2-40B4-BE49-F238E27FC236}">
+                <a16:creationId xmlns:a16="http://schemas.microsoft.com/office/drawing/2014/main" id="{F40770A5-9D97-4A3D-B153-6A9945C1550D}"/>
+              </a:ext>
+            </a:extLst>
+          </p:cNvPr>
+          <p:cNvSpPr txBox="1">
+            <a:spLocks/>
+          </p:cNvSpPr>
+          <p:nvPr/>
+        </p:nvSpPr>
+        <p:spPr>
+          <a:xfrm>
+            <a:off x="9174692" y="6176963"/>
+            <a:ext cx="2754086" cy="558140"/>
+          </a:xfrm>
+          <a:prstGeom prst="rect">
+            <a:avLst/>
+          </a:prstGeom>
+        </p:spPr>
+        <p:txBody>
+          <a:bodyPr vert="horz" lIns="91440" tIns="45720" rIns="91440" bIns="45720" rtlCol="0">
+            <a:normAutofit/>
+          </a:bodyPr>
+          <a:lstStyle>
+            <a:lvl1pPr marL="228600" indent="-228600" algn="l" defTabSz="914400" rtl="0" eaLnBrk="1" latinLnBrk="0" hangingPunct="1">
+              <a:lnSpc>
+                <a:spcPct val="90000"/>
+              </a:lnSpc>
+              <a:spcBef>
+                <a:spcPts val="1000"/>
+              </a:spcBef>
+              <a:buFont typeface="Arial" panose="020B0604020202020204" pitchFamily="34" charset="0"/>
+              <a:buChar char="•"/>
+              <a:defRPr sz="2800" kern="1200">
+                <a:solidFill>
+                  <a:schemeClr val="tx1"/>
+                </a:solidFill>
+                <a:latin typeface="+mn-lt"/>
+                <a:ea typeface="+mn-ea"/>
+                <a:cs typeface="+mn-cs"/>
+              </a:defRPr>
+            </a:lvl1pPr>
+            <a:lvl2pPr marL="685800" indent="-228600" algn="l" defTabSz="914400" rtl="0" eaLnBrk="1" latinLnBrk="0" hangingPunct="1">
+              <a:lnSpc>
+                <a:spcPct val="90000"/>
+              </a:lnSpc>
+              <a:spcBef>
+                <a:spcPts val="500"/>
+              </a:spcBef>
+              <a:buFont typeface="Arial" panose="020B0604020202020204" pitchFamily="34" charset="0"/>
+              <a:buChar char="•"/>
+              <a:defRPr sz="2400" kern="1200">
+                <a:solidFill>
+                  <a:schemeClr val="tx1"/>
+                </a:solidFill>
+                <a:latin typeface="+mn-lt"/>
+                <a:ea typeface="+mn-ea"/>
+                <a:cs typeface="+mn-cs"/>
+              </a:defRPr>
+            </a:lvl2pPr>
+            <a:lvl3pPr marL="1143000" indent="-228600" algn="l" defTabSz="914400" rtl="0" eaLnBrk="1" latinLnBrk="0" hangingPunct="1">
+              <a:lnSpc>
+                <a:spcPct val="90000"/>
+              </a:lnSpc>
+              <a:spcBef>
+                <a:spcPts val="500"/>
+              </a:spcBef>
+              <a:buFont typeface="Arial" panose="020B0604020202020204" pitchFamily="34" charset="0"/>
+              <a:buChar char="•"/>
+              <a:defRPr sz="2000" kern="1200">
+                <a:solidFill>
+                  <a:schemeClr val="tx1"/>
+                </a:solidFill>
+                <a:latin typeface="+mn-lt"/>
+                <a:ea typeface="+mn-ea"/>
+                <a:cs typeface="+mn-cs"/>
+              </a:defRPr>
+            </a:lvl3pPr>
+            <a:lvl4pPr marL="1600200" indent="-228600" algn="l" defTabSz="914400" rtl="0" eaLnBrk="1" latinLnBrk="0" hangingPunct="1">
+              <a:lnSpc>
+                <a:spcPct val="90000"/>
+              </a:lnSpc>
+              <a:spcBef>
+                <a:spcPts val="500"/>
+              </a:spcBef>
+              <a:buFont typeface="Arial" panose="020B0604020202020204" pitchFamily="34" charset="0"/>
+              <a:buChar char="•"/>
+              <a:defRPr sz="1800" kern="1200">
+                <a:solidFill>
+                  <a:schemeClr val="tx1"/>
+                </a:solidFill>
+                <a:latin typeface="+mn-lt"/>
+                <a:ea typeface="+mn-ea"/>
+                <a:cs typeface="+mn-cs"/>
+              </a:defRPr>
+            </a:lvl4pPr>
+            <a:lvl5pPr marL="2057400" indent="-228600" algn="l" defTabSz="914400" rtl="0" eaLnBrk="1" latinLnBrk="0" hangingPunct="1">
+              <a:lnSpc>
+                <a:spcPct val="90000"/>
+              </a:lnSpc>
+              <a:spcBef>
+                <a:spcPts val="500"/>
+              </a:spcBef>
+              <a:buFont typeface="Arial" panose="020B0604020202020204" pitchFamily="34" charset="0"/>
+              <a:buChar char="•"/>
+              <a:defRPr sz="1800" kern="1200">
+                <a:solidFill>
+                  <a:schemeClr val="tx1"/>
+                </a:solidFill>
+                <a:latin typeface="+mn-lt"/>
+                <a:ea typeface="+mn-ea"/>
+                <a:cs typeface="+mn-cs"/>
+              </a:defRPr>
+            </a:lvl5pPr>
+            <a:lvl6pPr marL="2514600" indent="-228600" algn="l" defTabSz="914400" rtl="0" eaLnBrk="1" latinLnBrk="0" hangingPunct="1">
+              <a:lnSpc>
+                <a:spcPct val="90000"/>
+              </a:lnSpc>
+              <a:spcBef>
+                <a:spcPts val="500"/>
+              </a:spcBef>
+              <a:buFont typeface="Arial" panose="020B0604020202020204" pitchFamily="34" charset="0"/>
+              <a:buChar char="•"/>
+              <a:defRPr sz="1800" kern="1200">
+                <a:solidFill>
+                  <a:schemeClr val="tx1"/>
+                </a:solidFill>
+                <a:latin typeface="+mn-lt"/>
+                <a:ea typeface="+mn-ea"/>
+                <a:cs typeface="+mn-cs"/>
+              </a:defRPr>
+            </a:lvl6pPr>
+            <a:lvl7pPr marL="2971800" indent="-228600" algn="l" defTabSz="914400" rtl="0" eaLnBrk="1" latinLnBrk="0" hangingPunct="1">
+              <a:lnSpc>
+                <a:spcPct val="90000"/>
+              </a:lnSpc>
+              <a:spcBef>
+                <a:spcPts val="500"/>
+              </a:spcBef>
+              <a:buFont typeface="Arial" panose="020B0604020202020204" pitchFamily="34" charset="0"/>
+              <a:buChar char="•"/>
+              <a:defRPr sz="1800" kern="1200">
+                <a:solidFill>
+                  <a:schemeClr val="tx1"/>
+                </a:solidFill>
+                <a:latin typeface="+mn-lt"/>
+                <a:ea typeface="+mn-ea"/>
+                <a:cs typeface="+mn-cs"/>
+              </a:defRPr>
+            </a:lvl7pPr>
+            <a:lvl8pPr marL="3429000" indent="-228600" algn="l" defTabSz="914400" rtl="0" eaLnBrk="1" latinLnBrk="0" hangingPunct="1">
+              <a:lnSpc>
+                <a:spcPct val="90000"/>
+              </a:lnSpc>
+              <a:spcBef>
+                <a:spcPts val="500"/>
+              </a:spcBef>
+              <a:buFont typeface="Arial" panose="020B0604020202020204" pitchFamily="34" charset="0"/>
+              <a:buChar char="•"/>
+              <a:defRPr sz="1800" kern="1200">
+                <a:solidFill>
+                  <a:schemeClr val="tx1"/>
+                </a:solidFill>
+                <a:latin typeface="+mn-lt"/>
+                <a:ea typeface="+mn-ea"/>
+                <a:cs typeface="+mn-cs"/>
+              </a:defRPr>
+            </a:lvl8pPr>
+            <a:lvl9pPr marL="3886200" indent="-228600" algn="l" defTabSz="914400" rtl="0" eaLnBrk="1" latinLnBrk="0" hangingPunct="1">
+              <a:lnSpc>
+                <a:spcPct val="90000"/>
+              </a:lnSpc>
+              <a:spcBef>
+                <a:spcPts val="500"/>
+              </a:spcBef>
+              <a:buFont typeface="Arial" panose="020B0604020202020204" pitchFamily="34" charset="0"/>
+              <a:buChar char="•"/>
+              <a:defRPr sz="1800" kern="1200">
+                <a:solidFill>
+                  <a:schemeClr val="tx1"/>
+                </a:solidFill>
+                <a:latin typeface="+mn-lt"/>
+                <a:ea typeface="+mn-ea"/>
+                <a:cs typeface="+mn-cs"/>
+              </a:defRPr>
+            </a:lvl9pPr>
+          </a:lstStyle>
+          <a:p>
+            <a:pPr marL="0" indent="0">
+              <a:buFont typeface="Arial" panose="020B0604020202020204" pitchFamily="34" charset="0"/>
+              <a:buNone/>
+            </a:pPr>
+            <a:r>
+              <a:rPr lang="en-US"/>
+              <a:t>Garrick Bruening</a:t>
+            </a:r>
+            <a:endParaRPr lang="en-US" dirty="0"/>
+          </a:p>
+        </p:txBody>
+      </p:sp>
       <p:pic>
         <p:nvPicPr>
-          <p:cNvPr id="5" name="Picture 4" descr="Graphical user interface&#10;&#10;Description automatically generated">
+          <p:cNvPr id="3" name="Picture 2" descr="A screenshot of a computer&#10;&#10;Description automatically generated with medium confidence">
             <a:extLst>
               <a:ext uri="{FF2B5EF4-FFF2-40B4-BE49-F238E27FC236}">
-                <a16:creationId xmlns:a16="http://schemas.microsoft.com/office/drawing/2014/main" id="{58801C14-A37F-4FEE-94BC-C9862A845F84}"/>
+                <a16:creationId xmlns:a16="http://schemas.microsoft.com/office/drawing/2014/main" id="{93B84EBF-2A9A-48E7-A30B-68814992ECF1}"/>
               </a:ext>
             </a:extLst>
           </p:cNvPr>
@@ -4008,7 +5375,7 @@
           <p:nvPr/>
         </p:nvPicPr>
         <p:blipFill>
-          <a:blip r:embed="rId2">
+          <a:blip r:embed="rId3">
             <a:extLst>
               <a:ext uri="{28A0092B-C50C-407E-A947-70E740481C1C}">
                 <a14:useLocalDpi xmlns:a14="http://schemas.microsoft.com/office/drawing/2010/main" val="0"/>
@@ -4021,705 +5388,14 @@
         </p:blipFill>
         <p:spPr>
           <a:xfrm>
-            <a:off x="5152677" y="1174779"/>
-            <a:ext cx="6635889" cy="4890436"/>
+            <a:off x="5535022" y="1390650"/>
+            <a:ext cx="5626926" cy="4076700"/>
           </a:xfrm>
           <a:prstGeom prst="rect">
             <a:avLst/>
           </a:prstGeom>
         </p:spPr>
       </p:pic>
-      <p:sp>
-        <p:nvSpPr>
-          <p:cNvPr id="6" name="Title 1">
-            <a:extLst>
-              <a:ext uri="{FF2B5EF4-FFF2-40B4-BE49-F238E27FC236}">
-                <a16:creationId xmlns:a16="http://schemas.microsoft.com/office/drawing/2014/main" id="{640DE1D3-36F2-4648-AF90-7621DE8D5A7A}"/>
-              </a:ext>
-            </a:extLst>
-          </p:cNvPr>
-          <p:cNvSpPr txBox="1">
-            <a:spLocks/>
-          </p:cNvSpPr>
-          <p:nvPr/>
-        </p:nvSpPr>
-        <p:spPr>
-          <a:xfrm>
-            <a:off x="468365" y="244766"/>
-            <a:ext cx="6025877" cy="872542"/>
-          </a:xfrm>
-          <a:prstGeom prst="rect">
-            <a:avLst/>
-          </a:prstGeom>
-        </p:spPr>
-        <p:txBody>
-          <a:bodyPr vert="horz" lIns="91440" tIns="45720" rIns="91440" bIns="45720" rtlCol="0" anchor="b">
-            <a:normAutofit fontScale="85000" lnSpcReduction="10000"/>
-          </a:bodyPr>
-          <a:lstStyle>
-            <a:lvl1pPr algn="ctr" defTabSz="914400" rtl="0" eaLnBrk="1" latinLnBrk="0" hangingPunct="1">
-              <a:lnSpc>
-                <a:spcPct val="90000"/>
-              </a:lnSpc>
-              <a:spcBef>
-                <a:spcPct val="0"/>
-              </a:spcBef>
-              <a:buNone/>
-              <a:defRPr sz="6000" kern="1200">
-                <a:solidFill>
-                  <a:schemeClr val="tx1"/>
-                </a:solidFill>
-                <a:latin typeface="+mj-lt"/>
-                <a:ea typeface="+mj-ea"/>
-                <a:cs typeface="+mj-cs"/>
-              </a:defRPr>
-            </a:lvl1pPr>
-          </a:lstStyle>
-          <a:p>
-            <a:pPr algn="l"/>
-            <a:r>
-              <a:rPr lang="en-US" dirty="0">
-                <a:solidFill>
-                  <a:srgbClr val="FFCC00"/>
-                </a:solidFill>
-                <a:latin typeface="+mn-lt"/>
-              </a:rPr>
-              <a:t>Individual group data</a:t>
-            </a:r>
-          </a:p>
-        </p:txBody>
-      </p:sp>
-      <p:sp>
-        <p:nvSpPr>
-          <p:cNvPr id="7" name="Content Placeholder 2">
-            <a:extLst>
-              <a:ext uri="{FF2B5EF4-FFF2-40B4-BE49-F238E27FC236}">
-                <a16:creationId xmlns:a16="http://schemas.microsoft.com/office/drawing/2014/main" id="{D713D7AB-A025-4DB6-B232-FF4B7E9D2EDF}"/>
-              </a:ext>
-            </a:extLst>
-          </p:cNvPr>
-          <p:cNvSpPr txBox="1">
-            <a:spLocks/>
-          </p:cNvSpPr>
-          <p:nvPr/>
-        </p:nvSpPr>
-        <p:spPr>
-          <a:xfrm>
-            <a:off x="838200" y="1825625"/>
-            <a:ext cx="6443628" cy="4351338"/>
-          </a:xfrm>
-          <a:prstGeom prst="rect">
-            <a:avLst/>
-          </a:prstGeom>
-        </p:spPr>
-        <p:txBody>
-          <a:bodyPr vert="horz" lIns="91440" tIns="45720" rIns="91440" bIns="45720" rtlCol="0">
-            <a:normAutofit/>
-          </a:bodyPr>
-          <a:lstStyle>
-            <a:lvl1pPr marL="0" indent="0" algn="ctr" defTabSz="914400" rtl="0" eaLnBrk="1" latinLnBrk="0" hangingPunct="1">
-              <a:lnSpc>
-                <a:spcPct val="90000"/>
-              </a:lnSpc>
-              <a:spcBef>
-                <a:spcPts val="1000"/>
-              </a:spcBef>
-              <a:buFont typeface="Arial" panose="020B0604020202020204" pitchFamily="34" charset="0"/>
-              <a:buNone/>
-              <a:defRPr sz="2400" kern="1200">
-                <a:solidFill>
-                  <a:schemeClr val="tx1"/>
-                </a:solidFill>
-                <a:latin typeface="+mn-lt"/>
-                <a:ea typeface="+mn-ea"/>
-                <a:cs typeface="+mn-cs"/>
-              </a:defRPr>
-            </a:lvl1pPr>
-            <a:lvl2pPr marL="457200" indent="0" algn="ctr" defTabSz="914400" rtl="0" eaLnBrk="1" latinLnBrk="0" hangingPunct="1">
-              <a:lnSpc>
-                <a:spcPct val="90000"/>
-              </a:lnSpc>
-              <a:spcBef>
-                <a:spcPts val="500"/>
-              </a:spcBef>
-              <a:buFont typeface="Arial" panose="020B0604020202020204" pitchFamily="34" charset="0"/>
-              <a:buNone/>
-              <a:defRPr sz="2000" kern="1200">
-                <a:solidFill>
-                  <a:schemeClr val="tx1"/>
-                </a:solidFill>
-                <a:latin typeface="+mn-lt"/>
-                <a:ea typeface="+mn-ea"/>
-                <a:cs typeface="+mn-cs"/>
-              </a:defRPr>
-            </a:lvl2pPr>
-            <a:lvl3pPr marL="914400" indent="0" algn="ctr" defTabSz="914400" rtl="0" eaLnBrk="1" latinLnBrk="0" hangingPunct="1">
-              <a:lnSpc>
-                <a:spcPct val="90000"/>
-              </a:lnSpc>
-              <a:spcBef>
-                <a:spcPts val="500"/>
-              </a:spcBef>
-              <a:buFont typeface="Arial" panose="020B0604020202020204" pitchFamily="34" charset="0"/>
-              <a:buNone/>
-              <a:defRPr sz="1800" kern="1200">
-                <a:solidFill>
-                  <a:schemeClr val="tx1"/>
-                </a:solidFill>
-                <a:latin typeface="+mn-lt"/>
-                <a:ea typeface="+mn-ea"/>
-                <a:cs typeface="+mn-cs"/>
-              </a:defRPr>
-            </a:lvl3pPr>
-            <a:lvl4pPr marL="1371600" indent="0" algn="ctr" defTabSz="914400" rtl="0" eaLnBrk="1" latinLnBrk="0" hangingPunct="1">
-              <a:lnSpc>
-                <a:spcPct val="90000"/>
-              </a:lnSpc>
-              <a:spcBef>
-                <a:spcPts val="500"/>
-              </a:spcBef>
-              <a:buFont typeface="Arial" panose="020B0604020202020204" pitchFamily="34" charset="0"/>
-              <a:buNone/>
-              <a:defRPr sz="1600" kern="1200">
-                <a:solidFill>
-                  <a:schemeClr val="tx1"/>
-                </a:solidFill>
-                <a:latin typeface="+mn-lt"/>
-                <a:ea typeface="+mn-ea"/>
-                <a:cs typeface="+mn-cs"/>
-              </a:defRPr>
-            </a:lvl4pPr>
-            <a:lvl5pPr marL="1828800" indent="0" algn="ctr" defTabSz="914400" rtl="0" eaLnBrk="1" latinLnBrk="0" hangingPunct="1">
-              <a:lnSpc>
-                <a:spcPct val="90000"/>
-              </a:lnSpc>
-              <a:spcBef>
-                <a:spcPts val="500"/>
-              </a:spcBef>
-              <a:buFont typeface="Arial" panose="020B0604020202020204" pitchFamily="34" charset="0"/>
-              <a:buNone/>
-              <a:defRPr sz="1600" kern="1200">
-                <a:solidFill>
-                  <a:schemeClr val="tx1"/>
-                </a:solidFill>
-                <a:latin typeface="+mn-lt"/>
-                <a:ea typeface="+mn-ea"/>
-                <a:cs typeface="+mn-cs"/>
-              </a:defRPr>
-            </a:lvl5pPr>
-            <a:lvl6pPr marL="2286000" indent="0" algn="ctr" defTabSz="914400" rtl="0" eaLnBrk="1" latinLnBrk="0" hangingPunct="1">
-              <a:lnSpc>
-                <a:spcPct val="90000"/>
-              </a:lnSpc>
-              <a:spcBef>
-                <a:spcPts val="500"/>
-              </a:spcBef>
-              <a:buFont typeface="Arial" panose="020B0604020202020204" pitchFamily="34" charset="0"/>
-              <a:buNone/>
-              <a:defRPr sz="1600" kern="1200">
-                <a:solidFill>
-                  <a:schemeClr val="tx1"/>
-                </a:solidFill>
-                <a:latin typeface="+mn-lt"/>
-                <a:ea typeface="+mn-ea"/>
-                <a:cs typeface="+mn-cs"/>
-              </a:defRPr>
-            </a:lvl6pPr>
-            <a:lvl7pPr marL="2743200" indent="0" algn="ctr" defTabSz="914400" rtl="0" eaLnBrk="1" latinLnBrk="0" hangingPunct="1">
-              <a:lnSpc>
-                <a:spcPct val="90000"/>
-              </a:lnSpc>
-              <a:spcBef>
-                <a:spcPts val="500"/>
-              </a:spcBef>
-              <a:buFont typeface="Arial" panose="020B0604020202020204" pitchFamily="34" charset="0"/>
-              <a:buNone/>
-              <a:defRPr sz="1600" kern="1200">
-                <a:solidFill>
-                  <a:schemeClr val="tx1"/>
-                </a:solidFill>
-                <a:latin typeface="+mn-lt"/>
-                <a:ea typeface="+mn-ea"/>
-                <a:cs typeface="+mn-cs"/>
-              </a:defRPr>
-            </a:lvl7pPr>
-            <a:lvl8pPr marL="3200400" indent="0" algn="ctr" defTabSz="914400" rtl="0" eaLnBrk="1" latinLnBrk="0" hangingPunct="1">
-              <a:lnSpc>
-                <a:spcPct val="90000"/>
-              </a:lnSpc>
-              <a:spcBef>
-                <a:spcPts val="500"/>
-              </a:spcBef>
-              <a:buFont typeface="Arial" panose="020B0604020202020204" pitchFamily="34" charset="0"/>
-              <a:buNone/>
-              <a:defRPr sz="1600" kern="1200">
-                <a:solidFill>
-                  <a:schemeClr val="tx1"/>
-                </a:solidFill>
-                <a:latin typeface="+mn-lt"/>
-                <a:ea typeface="+mn-ea"/>
-                <a:cs typeface="+mn-cs"/>
-              </a:defRPr>
-            </a:lvl8pPr>
-            <a:lvl9pPr marL="3657600" indent="0" algn="ctr" defTabSz="914400" rtl="0" eaLnBrk="1" latinLnBrk="0" hangingPunct="1">
-              <a:lnSpc>
-                <a:spcPct val="90000"/>
-              </a:lnSpc>
-              <a:spcBef>
-                <a:spcPts val="500"/>
-              </a:spcBef>
-              <a:buFont typeface="Arial" panose="020B0604020202020204" pitchFamily="34" charset="0"/>
-              <a:buNone/>
-              <a:defRPr sz="1600" kern="1200">
-                <a:solidFill>
-                  <a:schemeClr val="tx1"/>
-                </a:solidFill>
-                <a:latin typeface="+mn-lt"/>
-                <a:ea typeface="+mn-ea"/>
-                <a:cs typeface="+mn-cs"/>
-              </a:defRPr>
-            </a:lvl9pPr>
-          </a:lstStyle>
-          <a:p>
-            <a:endParaRPr lang="en-US" dirty="0"/>
-          </a:p>
-        </p:txBody>
-      </p:sp>
-      <p:sp>
-        <p:nvSpPr>
-          <p:cNvPr id="11" name="Content Placeholder 2">
-            <a:extLst>
-              <a:ext uri="{FF2B5EF4-FFF2-40B4-BE49-F238E27FC236}">
-                <a16:creationId xmlns:a16="http://schemas.microsoft.com/office/drawing/2014/main" id="{CAE7C721-240E-4E35-B61A-D4CB70AD2F45}"/>
-              </a:ext>
-            </a:extLst>
-          </p:cNvPr>
-          <p:cNvSpPr txBox="1">
-            <a:spLocks/>
-          </p:cNvSpPr>
-          <p:nvPr/>
-        </p:nvSpPr>
-        <p:spPr>
-          <a:xfrm>
-            <a:off x="838200" y="1717720"/>
-            <a:ext cx="3628121" cy="4282611"/>
-          </a:xfrm>
-          <a:prstGeom prst="rect">
-            <a:avLst/>
-          </a:prstGeom>
-        </p:spPr>
-        <p:txBody>
-          <a:bodyPr vert="horz" lIns="91440" tIns="45720" rIns="91440" bIns="45720" rtlCol="0">
-            <a:normAutofit/>
-          </a:bodyPr>
-          <a:lstStyle>
-            <a:lvl1pPr marL="0" indent="0" algn="ctr" defTabSz="914400" rtl="0" eaLnBrk="1" latinLnBrk="0" hangingPunct="1">
-              <a:lnSpc>
-                <a:spcPct val="90000"/>
-              </a:lnSpc>
-              <a:spcBef>
-                <a:spcPts val="1000"/>
-              </a:spcBef>
-              <a:buFont typeface="Arial" panose="020B0604020202020204" pitchFamily="34" charset="0"/>
-              <a:buNone/>
-              <a:defRPr sz="2400" kern="1200">
-                <a:solidFill>
-                  <a:schemeClr val="tx1"/>
-                </a:solidFill>
-                <a:latin typeface="+mn-lt"/>
-                <a:ea typeface="+mn-ea"/>
-                <a:cs typeface="+mn-cs"/>
-              </a:defRPr>
-            </a:lvl1pPr>
-            <a:lvl2pPr marL="457200" indent="0" algn="ctr" defTabSz="914400" rtl="0" eaLnBrk="1" latinLnBrk="0" hangingPunct="1">
-              <a:lnSpc>
-                <a:spcPct val="90000"/>
-              </a:lnSpc>
-              <a:spcBef>
-                <a:spcPts val="500"/>
-              </a:spcBef>
-              <a:buFont typeface="Arial" panose="020B0604020202020204" pitchFamily="34" charset="0"/>
-              <a:buNone/>
-              <a:defRPr sz="2000" kern="1200">
-                <a:solidFill>
-                  <a:schemeClr val="tx1"/>
-                </a:solidFill>
-                <a:latin typeface="+mn-lt"/>
-                <a:ea typeface="+mn-ea"/>
-                <a:cs typeface="+mn-cs"/>
-              </a:defRPr>
-            </a:lvl2pPr>
-            <a:lvl3pPr marL="914400" indent="0" algn="ctr" defTabSz="914400" rtl="0" eaLnBrk="1" latinLnBrk="0" hangingPunct="1">
-              <a:lnSpc>
-                <a:spcPct val="90000"/>
-              </a:lnSpc>
-              <a:spcBef>
-                <a:spcPts val="500"/>
-              </a:spcBef>
-              <a:buFont typeface="Arial" panose="020B0604020202020204" pitchFamily="34" charset="0"/>
-              <a:buNone/>
-              <a:defRPr sz="1800" kern="1200">
-                <a:solidFill>
-                  <a:schemeClr val="tx1"/>
-                </a:solidFill>
-                <a:latin typeface="+mn-lt"/>
-                <a:ea typeface="+mn-ea"/>
-                <a:cs typeface="+mn-cs"/>
-              </a:defRPr>
-            </a:lvl3pPr>
-            <a:lvl4pPr marL="1371600" indent="0" algn="ctr" defTabSz="914400" rtl="0" eaLnBrk="1" latinLnBrk="0" hangingPunct="1">
-              <a:lnSpc>
-                <a:spcPct val="90000"/>
-              </a:lnSpc>
-              <a:spcBef>
-                <a:spcPts val="500"/>
-              </a:spcBef>
-              <a:buFont typeface="Arial" panose="020B0604020202020204" pitchFamily="34" charset="0"/>
-              <a:buNone/>
-              <a:defRPr sz="1600" kern="1200">
-                <a:solidFill>
-                  <a:schemeClr val="tx1"/>
-                </a:solidFill>
-                <a:latin typeface="+mn-lt"/>
-                <a:ea typeface="+mn-ea"/>
-                <a:cs typeface="+mn-cs"/>
-              </a:defRPr>
-            </a:lvl4pPr>
-            <a:lvl5pPr marL="1828800" indent="0" algn="ctr" defTabSz="914400" rtl="0" eaLnBrk="1" latinLnBrk="0" hangingPunct="1">
-              <a:lnSpc>
-                <a:spcPct val="90000"/>
-              </a:lnSpc>
-              <a:spcBef>
-                <a:spcPts val="500"/>
-              </a:spcBef>
-              <a:buFont typeface="Arial" panose="020B0604020202020204" pitchFamily="34" charset="0"/>
-              <a:buNone/>
-              <a:defRPr sz="1600" kern="1200">
-                <a:solidFill>
-                  <a:schemeClr val="tx1"/>
-                </a:solidFill>
-                <a:latin typeface="+mn-lt"/>
-                <a:ea typeface="+mn-ea"/>
-                <a:cs typeface="+mn-cs"/>
-              </a:defRPr>
-            </a:lvl5pPr>
-            <a:lvl6pPr marL="2286000" indent="0" algn="ctr" defTabSz="914400" rtl="0" eaLnBrk="1" latinLnBrk="0" hangingPunct="1">
-              <a:lnSpc>
-                <a:spcPct val="90000"/>
-              </a:lnSpc>
-              <a:spcBef>
-                <a:spcPts val="500"/>
-              </a:spcBef>
-              <a:buFont typeface="Arial" panose="020B0604020202020204" pitchFamily="34" charset="0"/>
-              <a:buNone/>
-              <a:defRPr sz="1600" kern="1200">
-                <a:solidFill>
-                  <a:schemeClr val="tx1"/>
-                </a:solidFill>
-                <a:latin typeface="+mn-lt"/>
-                <a:ea typeface="+mn-ea"/>
-                <a:cs typeface="+mn-cs"/>
-              </a:defRPr>
-            </a:lvl6pPr>
-            <a:lvl7pPr marL="2743200" indent="0" algn="ctr" defTabSz="914400" rtl="0" eaLnBrk="1" latinLnBrk="0" hangingPunct="1">
-              <a:lnSpc>
-                <a:spcPct val="90000"/>
-              </a:lnSpc>
-              <a:spcBef>
-                <a:spcPts val="500"/>
-              </a:spcBef>
-              <a:buFont typeface="Arial" panose="020B0604020202020204" pitchFamily="34" charset="0"/>
-              <a:buNone/>
-              <a:defRPr sz="1600" kern="1200">
-                <a:solidFill>
-                  <a:schemeClr val="tx1"/>
-                </a:solidFill>
-                <a:latin typeface="+mn-lt"/>
-                <a:ea typeface="+mn-ea"/>
-                <a:cs typeface="+mn-cs"/>
-              </a:defRPr>
-            </a:lvl7pPr>
-            <a:lvl8pPr marL="3200400" indent="0" algn="ctr" defTabSz="914400" rtl="0" eaLnBrk="1" latinLnBrk="0" hangingPunct="1">
-              <a:lnSpc>
-                <a:spcPct val="90000"/>
-              </a:lnSpc>
-              <a:spcBef>
-                <a:spcPts val="500"/>
-              </a:spcBef>
-              <a:buFont typeface="Arial" panose="020B0604020202020204" pitchFamily="34" charset="0"/>
-              <a:buNone/>
-              <a:defRPr sz="1600" kern="1200">
-                <a:solidFill>
-                  <a:schemeClr val="tx1"/>
-                </a:solidFill>
-                <a:latin typeface="+mn-lt"/>
-                <a:ea typeface="+mn-ea"/>
-                <a:cs typeface="+mn-cs"/>
-              </a:defRPr>
-            </a:lvl8pPr>
-            <a:lvl9pPr marL="3657600" indent="0" algn="ctr" defTabSz="914400" rtl="0" eaLnBrk="1" latinLnBrk="0" hangingPunct="1">
-              <a:lnSpc>
-                <a:spcPct val="90000"/>
-              </a:lnSpc>
-              <a:spcBef>
-                <a:spcPts val="500"/>
-              </a:spcBef>
-              <a:buFont typeface="Arial" panose="020B0604020202020204" pitchFamily="34" charset="0"/>
-              <a:buNone/>
-              <a:defRPr sz="1600" kern="1200">
-                <a:solidFill>
-                  <a:schemeClr val="tx1"/>
-                </a:solidFill>
-                <a:latin typeface="+mn-lt"/>
-                <a:ea typeface="+mn-ea"/>
-                <a:cs typeface="+mn-cs"/>
-              </a:defRPr>
-            </a:lvl9pPr>
-          </a:lstStyle>
-          <a:p>
-            <a:pPr marL="342900" indent="-342900" algn="l">
-              <a:buFont typeface="Arial" panose="020B0604020202020204" pitchFamily="34" charset="0"/>
-              <a:buChar char="•"/>
-            </a:pPr>
-            <a:r>
-              <a:rPr lang="en-US" dirty="0"/>
-              <a:t>Data can be obtained through either web scraping or a website API.</a:t>
-            </a:r>
-          </a:p>
-          <a:p>
-            <a:pPr marL="342900" indent="-342900" algn="l">
-              <a:buFont typeface="Arial" panose="020B0604020202020204" pitchFamily="34" charset="0"/>
-              <a:buChar char="•"/>
-            </a:pPr>
-            <a:endParaRPr lang="en-US" dirty="0"/>
-          </a:p>
-          <a:p>
-            <a:pPr marL="342900" indent="-342900" algn="l">
-              <a:buFont typeface="Arial" panose="020B0604020202020204" pitchFamily="34" charset="0"/>
-              <a:buChar char="•"/>
-            </a:pPr>
-            <a:r>
-              <a:rPr lang="en-US" dirty="0"/>
-              <a:t>We can present each groups progression in easily understandable manner.</a:t>
-            </a:r>
-          </a:p>
-          <a:p>
-            <a:pPr algn="l"/>
-            <a:endParaRPr lang="en-US" dirty="0"/>
-          </a:p>
-          <a:p>
-            <a:pPr marL="342900" indent="-342900" algn="l">
-              <a:buFont typeface="Arial" panose="020B0604020202020204" pitchFamily="34" charset="0"/>
-              <a:buChar char="•"/>
-            </a:pPr>
-            <a:endParaRPr lang="en-US" dirty="0"/>
-          </a:p>
-        </p:txBody>
-      </p:sp>
-      <p:sp>
-        <p:nvSpPr>
-          <p:cNvPr id="8" name="Content Placeholder 2">
-            <a:extLst>
-              <a:ext uri="{FF2B5EF4-FFF2-40B4-BE49-F238E27FC236}">
-                <a16:creationId xmlns:a16="http://schemas.microsoft.com/office/drawing/2014/main" id="{F40770A5-9D97-4A3D-B153-6A9945C1550D}"/>
-              </a:ext>
-            </a:extLst>
-          </p:cNvPr>
-          <p:cNvSpPr txBox="1">
-            <a:spLocks/>
-          </p:cNvSpPr>
-          <p:nvPr/>
-        </p:nvSpPr>
-        <p:spPr>
-          <a:xfrm>
-            <a:off x="9174692" y="6176963"/>
-            <a:ext cx="2754086" cy="558140"/>
-          </a:xfrm>
-          <a:prstGeom prst="rect">
-            <a:avLst/>
-          </a:prstGeom>
-        </p:spPr>
-        <p:txBody>
-          <a:bodyPr vert="horz" lIns="91440" tIns="45720" rIns="91440" bIns="45720" rtlCol="0">
-            <a:normAutofit/>
-          </a:bodyPr>
-          <a:lstStyle>
-            <a:lvl1pPr marL="228600" indent="-228600" algn="l" defTabSz="914400" rtl="0" eaLnBrk="1" latinLnBrk="0" hangingPunct="1">
-              <a:lnSpc>
-                <a:spcPct val="90000"/>
-              </a:lnSpc>
-              <a:spcBef>
-                <a:spcPts val="1000"/>
-              </a:spcBef>
-              <a:buFont typeface="Arial" panose="020B0604020202020204" pitchFamily="34" charset="0"/>
-              <a:buChar char="•"/>
-              <a:defRPr sz="2800" kern="1200">
-                <a:solidFill>
-                  <a:schemeClr val="tx1"/>
-                </a:solidFill>
-                <a:latin typeface="+mn-lt"/>
-                <a:ea typeface="+mn-ea"/>
-                <a:cs typeface="+mn-cs"/>
-              </a:defRPr>
-            </a:lvl1pPr>
-            <a:lvl2pPr marL="685800" indent="-228600" algn="l" defTabSz="914400" rtl="0" eaLnBrk="1" latinLnBrk="0" hangingPunct="1">
-              <a:lnSpc>
-                <a:spcPct val="90000"/>
-              </a:lnSpc>
-              <a:spcBef>
-                <a:spcPts val="500"/>
-              </a:spcBef>
-              <a:buFont typeface="Arial" panose="020B0604020202020204" pitchFamily="34" charset="0"/>
-              <a:buChar char="•"/>
-              <a:defRPr sz="2400" kern="1200">
-                <a:solidFill>
-                  <a:schemeClr val="tx1"/>
-                </a:solidFill>
-                <a:latin typeface="+mn-lt"/>
-                <a:ea typeface="+mn-ea"/>
-                <a:cs typeface="+mn-cs"/>
-              </a:defRPr>
-            </a:lvl2pPr>
-            <a:lvl3pPr marL="1143000" indent="-228600" algn="l" defTabSz="914400" rtl="0" eaLnBrk="1" latinLnBrk="0" hangingPunct="1">
-              <a:lnSpc>
-                <a:spcPct val="90000"/>
-              </a:lnSpc>
-              <a:spcBef>
-                <a:spcPts val="500"/>
-              </a:spcBef>
-              <a:buFont typeface="Arial" panose="020B0604020202020204" pitchFamily="34" charset="0"/>
-              <a:buChar char="•"/>
-              <a:defRPr sz="2000" kern="1200">
-                <a:solidFill>
-                  <a:schemeClr val="tx1"/>
-                </a:solidFill>
-                <a:latin typeface="+mn-lt"/>
-                <a:ea typeface="+mn-ea"/>
-                <a:cs typeface="+mn-cs"/>
-              </a:defRPr>
-            </a:lvl3pPr>
-            <a:lvl4pPr marL="1600200" indent="-228600" algn="l" defTabSz="914400" rtl="0" eaLnBrk="1" latinLnBrk="0" hangingPunct="1">
-              <a:lnSpc>
-                <a:spcPct val="90000"/>
-              </a:lnSpc>
-              <a:spcBef>
-                <a:spcPts val="500"/>
-              </a:spcBef>
-              <a:buFont typeface="Arial" panose="020B0604020202020204" pitchFamily="34" charset="0"/>
-              <a:buChar char="•"/>
-              <a:defRPr sz="1800" kern="1200">
-                <a:solidFill>
-                  <a:schemeClr val="tx1"/>
-                </a:solidFill>
-                <a:latin typeface="+mn-lt"/>
-                <a:ea typeface="+mn-ea"/>
-                <a:cs typeface="+mn-cs"/>
-              </a:defRPr>
-            </a:lvl4pPr>
-            <a:lvl5pPr marL="2057400" indent="-228600" algn="l" defTabSz="914400" rtl="0" eaLnBrk="1" latinLnBrk="0" hangingPunct="1">
-              <a:lnSpc>
-                <a:spcPct val="90000"/>
-              </a:lnSpc>
-              <a:spcBef>
-                <a:spcPts val="500"/>
-              </a:spcBef>
-              <a:buFont typeface="Arial" panose="020B0604020202020204" pitchFamily="34" charset="0"/>
-              <a:buChar char="•"/>
-              <a:defRPr sz="1800" kern="1200">
-                <a:solidFill>
-                  <a:schemeClr val="tx1"/>
-                </a:solidFill>
-                <a:latin typeface="+mn-lt"/>
-                <a:ea typeface="+mn-ea"/>
-                <a:cs typeface="+mn-cs"/>
-              </a:defRPr>
-            </a:lvl5pPr>
-            <a:lvl6pPr marL="2514600" indent="-228600" algn="l" defTabSz="914400" rtl="0" eaLnBrk="1" latinLnBrk="0" hangingPunct="1">
-              <a:lnSpc>
-                <a:spcPct val="90000"/>
-              </a:lnSpc>
-              <a:spcBef>
-                <a:spcPts val="500"/>
-              </a:spcBef>
-              <a:buFont typeface="Arial" panose="020B0604020202020204" pitchFamily="34" charset="0"/>
-              <a:buChar char="•"/>
-              <a:defRPr sz="1800" kern="1200">
-                <a:solidFill>
-                  <a:schemeClr val="tx1"/>
-                </a:solidFill>
-                <a:latin typeface="+mn-lt"/>
-                <a:ea typeface="+mn-ea"/>
-                <a:cs typeface="+mn-cs"/>
-              </a:defRPr>
-            </a:lvl6pPr>
-            <a:lvl7pPr marL="2971800" indent="-228600" algn="l" defTabSz="914400" rtl="0" eaLnBrk="1" latinLnBrk="0" hangingPunct="1">
-              <a:lnSpc>
-                <a:spcPct val="90000"/>
-              </a:lnSpc>
-              <a:spcBef>
-                <a:spcPts val="500"/>
-              </a:spcBef>
-              <a:buFont typeface="Arial" panose="020B0604020202020204" pitchFamily="34" charset="0"/>
-              <a:buChar char="•"/>
-              <a:defRPr sz="1800" kern="1200">
-                <a:solidFill>
-                  <a:schemeClr val="tx1"/>
-                </a:solidFill>
-                <a:latin typeface="+mn-lt"/>
-                <a:ea typeface="+mn-ea"/>
-                <a:cs typeface="+mn-cs"/>
-              </a:defRPr>
-            </a:lvl7pPr>
-            <a:lvl8pPr marL="3429000" indent="-228600" algn="l" defTabSz="914400" rtl="0" eaLnBrk="1" latinLnBrk="0" hangingPunct="1">
-              <a:lnSpc>
-                <a:spcPct val="90000"/>
-              </a:lnSpc>
-              <a:spcBef>
-                <a:spcPts val="500"/>
-              </a:spcBef>
-              <a:buFont typeface="Arial" panose="020B0604020202020204" pitchFamily="34" charset="0"/>
-              <a:buChar char="•"/>
-              <a:defRPr sz="1800" kern="1200">
-                <a:solidFill>
-                  <a:schemeClr val="tx1"/>
-                </a:solidFill>
-                <a:latin typeface="+mn-lt"/>
-                <a:ea typeface="+mn-ea"/>
-                <a:cs typeface="+mn-cs"/>
-              </a:defRPr>
-            </a:lvl8pPr>
-            <a:lvl9pPr marL="3886200" indent="-228600" algn="l" defTabSz="914400" rtl="0" eaLnBrk="1" latinLnBrk="0" hangingPunct="1">
-              <a:lnSpc>
-                <a:spcPct val="90000"/>
-              </a:lnSpc>
-              <a:spcBef>
-                <a:spcPts val="500"/>
-              </a:spcBef>
-              <a:buFont typeface="Arial" panose="020B0604020202020204" pitchFamily="34" charset="0"/>
-              <a:buChar char="•"/>
-              <a:defRPr sz="1800" kern="1200">
-                <a:solidFill>
-                  <a:schemeClr val="tx1"/>
-                </a:solidFill>
-                <a:latin typeface="+mn-lt"/>
-                <a:ea typeface="+mn-ea"/>
-                <a:cs typeface="+mn-cs"/>
-              </a:defRPr>
-            </a:lvl9pPr>
-          </a:lstStyle>
-          <a:p>
-            <a:pPr marL="0" indent="0">
-              <a:buFont typeface="Arial" panose="020B0604020202020204" pitchFamily="34" charset="0"/>
-              <a:buNone/>
-            </a:pPr>
-            <a:r>
-              <a:rPr lang="en-US"/>
-              <a:t>Garrick Bruening</a:t>
-            </a:r>
-            <a:endParaRPr lang="en-US" dirty="0"/>
-          </a:p>
-        </p:txBody>
-      </p:sp>
     </p:spTree>
     <p:extLst>
       <p:ext uri="{BB962C8B-B14F-4D97-AF65-F5344CB8AC3E}">
@@ -4750,21 +5426,538 @@
           <a:chExt cx="0" cy="0"/>
         </a:xfrm>
       </p:grpSpPr>
+      <p:sp>
+        <p:nvSpPr>
+          <p:cNvPr id="6" name="Title 1">
+            <a:extLst>
+              <a:ext uri="{FF2B5EF4-FFF2-40B4-BE49-F238E27FC236}">
+                <a16:creationId xmlns:a16="http://schemas.microsoft.com/office/drawing/2014/main" id="{07D9BA98-FBA7-400E-B659-CE08722F4086}"/>
+              </a:ext>
+            </a:extLst>
+          </p:cNvPr>
+          <p:cNvSpPr txBox="1">
+            <a:spLocks/>
+          </p:cNvSpPr>
+          <p:nvPr/>
+        </p:nvSpPr>
+        <p:spPr>
+          <a:xfrm>
+            <a:off x="468365" y="216191"/>
+            <a:ext cx="6025877" cy="872542"/>
+          </a:xfrm>
+          <a:prstGeom prst="rect">
+            <a:avLst/>
+          </a:prstGeom>
+        </p:spPr>
+        <p:txBody>
+          <a:bodyPr vert="horz" lIns="91440" tIns="45720" rIns="91440" bIns="45720" rtlCol="0" anchor="b">
+            <a:normAutofit fontScale="77500" lnSpcReduction="20000"/>
+          </a:bodyPr>
+          <a:lstStyle>
+            <a:lvl1pPr algn="ctr" defTabSz="914400" rtl="0" eaLnBrk="1" latinLnBrk="0" hangingPunct="1">
+              <a:lnSpc>
+                <a:spcPct val="90000"/>
+              </a:lnSpc>
+              <a:spcBef>
+                <a:spcPct val="0"/>
+              </a:spcBef>
+              <a:buNone/>
+              <a:defRPr sz="6000" kern="1200">
+                <a:solidFill>
+                  <a:schemeClr val="tx1"/>
+                </a:solidFill>
+                <a:latin typeface="+mj-lt"/>
+                <a:ea typeface="+mj-ea"/>
+                <a:cs typeface="+mj-cs"/>
+              </a:defRPr>
+            </a:lvl1pPr>
+          </a:lstStyle>
+          <a:p>
+            <a:pPr algn="l"/>
+            <a:r>
+              <a:rPr lang="en-US" dirty="0">
+                <a:solidFill>
+                  <a:srgbClr val="FFCC00"/>
+                </a:solidFill>
+                <a:latin typeface="+mn-lt"/>
+              </a:rPr>
+              <a:t>Aggregated Group data</a:t>
+            </a:r>
+          </a:p>
+        </p:txBody>
+      </p:sp>
+      <p:sp>
+        <p:nvSpPr>
+          <p:cNvPr id="7" name="Content Placeholder 2">
+            <a:extLst>
+              <a:ext uri="{FF2B5EF4-FFF2-40B4-BE49-F238E27FC236}">
+                <a16:creationId xmlns:a16="http://schemas.microsoft.com/office/drawing/2014/main" id="{C12F1A20-35FC-44A7-8F84-3A695133EDA2}"/>
+              </a:ext>
+            </a:extLst>
+          </p:cNvPr>
+          <p:cNvSpPr txBox="1">
+            <a:spLocks/>
+          </p:cNvSpPr>
+          <p:nvPr/>
+        </p:nvSpPr>
+        <p:spPr>
+          <a:xfrm>
+            <a:off x="838200" y="1717720"/>
+            <a:ext cx="3628121" cy="4282611"/>
+          </a:xfrm>
+          <a:prstGeom prst="rect">
+            <a:avLst/>
+          </a:prstGeom>
+        </p:spPr>
+        <p:txBody>
+          <a:bodyPr vert="horz" lIns="91440" tIns="45720" rIns="91440" bIns="45720" rtlCol="0">
+            <a:normAutofit/>
+          </a:bodyPr>
+          <a:lstStyle>
+            <a:lvl1pPr marL="0" indent="0" algn="ctr" defTabSz="914400" rtl="0" eaLnBrk="1" latinLnBrk="0" hangingPunct="1">
+              <a:lnSpc>
+                <a:spcPct val="90000"/>
+              </a:lnSpc>
+              <a:spcBef>
+                <a:spcPts val="1000"/>
+              </a:spcBef>
+              <a:buFont typeface="Arial" panose="020B0604020202020204" pitchFamily="34" charset="0"/>
+              <a:buNone/>
+              <a:defRPr sz="2400" kern="1200">
+                <a:solidFill>
+                  <a:schemeClr val="tx1"/>
+                </a:solidFill>
+                <a:latin typeface="+mn-lt"/>
+                <a:ea typeface="+mn-ea"/>
+                <a:cs typeface="+mn-cs"/>
+              </a:defRPr>
+            </a:lvl1pPr>
+            <a:lvl2pPr marL="457200" indent="0" algn="ctr" defTabSz="914400" rtl="0" eaLnBrk="1" latinLnBrk="0" hangingPunct="1">
+              <a:lnSpc>
+                <a:spcPct val="90000"/>
+              </a:lnSpc>
+              <a:spcBef>
+                <a:spcPts val="500"/>
+              </a:spcBef>
+              <a:buFont typeface="Arial" panose="020B0604020202020204" pitchFamily="34" charset="0"/>
+              <a:buNone/>
+              <a:defRPr sz="2000" kern="1200">
+                <a:solidFill>
+                  <a:schemeClr val="tx1"/>
+                </a:solidFill>
+                <a:latin typeface="+mn-lt"/>
+                <a:ea typeface="+mn-ea"/>
+                <a:cs typeface="+mn-cs"/>
+              </a:defRPr>
+            </a:lvl2pPr>
+            <a:lvl3pPr marL="914400" indent="0" algn="ctr" defTabSz="914400" rtl="0" eaLnBrk="1" latinLnBrk="0" hangingPunct="1">
+              <a:lnSpc>
+                <a:spcPct val="90000"/>
+              </a:lnSpc>
+              <a:spcBef>
+                <a:spcPts val="500"/>
+              </a:spcBef>
+              <a:buFont typeface="Arial" panose="020B0604020202020204" pitchFamily="34" charset="0"/>
+              <a:buNone/>
+              <a:defRPr sz="1800" kern="1200">
+                <a:solidFill>
+                  <a:schemeClr val="tx1"/>
+                </a:solidFill>
+                <a:latin typeface="+mn-lt"/>
+                <a:ea typeface="+mn-ea"/>
+                <a:cs typeface="+mn-cs"/>
+              </a:defRPr>
+            </a:lvl3pPr>
+            <a:lvl4pPr marL="1371600" indent="0" algn="ctr" defTabSz="914400" rtl="0" eaLnBrk="1" latinLnBrk="0" hangingPunct="1">
+              <a:lnSpc>
+                <a:spcPct val="90000"/>
+              </a:lnSpc>
+              <a:spcBef>
+                <a:spcPts val="500"/>
+              </a:spcBef>
+              <a:buFont typeface="Arial" panose="020B0604020202020204" pitchFamily="34" charset="0"/>
+              <a:buNone/>
+              <a:defRPr sz="1600" kern="1200">
+                <a:solidFill>
+                  <a:schemeClr val="tx1"/>
+                </a:solidFill>
+                <a:latin typeface="+mn-lt"/>
+                <a:ea typeface="+mn-ea"/>
+                <a:cs typeface="+mn-cs"/>
+              </a:defRPr>
+            </a:lvl4pPr>
+            <a:lvl5pPr marL="1828800" indent="0" algn="ctr" defTabSz="914400" rtl="0" eaLnBrk="1" latinLnBrk="0" hangingPunct="1">
+              <a:lnSpc>
+                <a:spcPct val="90000"/>
+              </a:lnSpc>
+              <a:spcBef>
+                <a:spcPts val="500"/>
+              </a:spcBef>
+              <a:buFont typeface="Arial" panose="020B0604020202020204" pitchFamily="34" charset="0"/>
+              <a:buNone/>
+              <a:defRPr sz="1600" kern="1200">
+                <a:solidFill>
+                  <a:schemeClr val="tx1"/>
+                </a:solidFill>
+                <a:latin typeface="+mn-lt"/>
+                <a:ea typeface="+mn-ea"/>
+                <a:cs typeface="+mn-cs"/>
+              </a:defRPr>
+            </a:lvl5pPr>
+            <a:lvl6pPr marL="2286000" indent="0" algn="ctr" defTabSz="914400" rtl="0" eaLnBrk="1" latinLnBrk="0" hangingPunct="1">
+              <a:lnSpc>
+                <a:spcPct val="90000"/>
+              </a:lnSpc>
+              <a:spcBef>
+                <a:spcPts val="500"/>
+              </a:spcBef>
+              <a:buFont typeface="Arial" panose="020B0604020202020204" pitchFamily="34" charset="0"/>
+              <a:buNone/>
+              <a:defRPr sz="1600" kern="1200">
+                <a:solidFill>
+                  <a:schemeClr val="tx1"/>
+                </a:solidFill>
+                <a:latin typeface="+mn-lt"/>
+                <a:ea typeface="+mn-ea"/>
+                <a:cs typeface="+mn-cs"/>
+              </a:defRPr>
+            </a:lvl6pPr>
+            <a:lvl7pPr marL="2743200" indent="0" algn="ctr" defTabSz="914400" rtl="0" eaLnBrk="1" latinLnBrk="0" hangingPunct="1">
+              <a:lnSpc>
+                <a:spcPct val="90000"/>
+              </a:lnSpc>
+              <a:spcBef>
+                <a:spcPts val="500"/>
+              </a:spcBef>
+              <a:buFont typeface="Arial" panose="020B0604020202020204" pitchFamily="34" charset="0"/>
+              <a:buNone/>
+              <a:defRPr sz="1600" kern="1200">
+                <a:solidFill>
+                  <a:schemeClr val="tx1"/>
+                </a:solidFill>
+                <a:latin typeface="+mn-lt"/>
+                <a:ea typeface="+mn-ea"/>
+                <a:cs typeface="+mn-cs"/>
+              </a:defRPr>
+            </a:lvl7pPr>
+            <a:lvl8pPr marL="3200400" indent="0" algn="ctr" defTabSz="914400" rtl="0" eaLnBrk="1" latinLnBrk="0" hangingPunct="1">
+              <a:lnSpc>
+                <a:spcPct val="90000"/>
+              </a:lnSpc>
+              <a:spcBef>
+                <a:spcPts val="500"/>
+              </a:spcBef>
+              <a:buFont typeface="Arial" panose="020B0604020202020204" pitchFamily="34" charset="0"/>
+              <a:buNone/>
+              <a:defRPr sz="1600" kern="1200">
+                <a:solidFill>
+                  <a:schemeClr val="tx1"/>
+                </a:solidFill>
+                <a:latin typeface="+mn-lt"/>
+                <a:ea typeface="+mn-ea"/>
+                <a:cs typeface="+mn-cs"/>
+              </a:defRPr>
+            </a:lvl8pPr>
+            <a:lvl9pPr marL="3657600" indent="0" algn="ctr" defTabSz="914400" rtl="0" eaLnBrk="1" latinLnBrk="0" hangingPunct="1">
+              <a:lnSpc>
+                <a:spcPct val="90000"/>
+              </a:lnSpc>
+              <a:spcBef>
+                <a:spcPts val="500"/>
+              </a:spcBef>
+              <a:buFont typeface="Arial" panose="020B0604020202020204" pitchFamily="34" charset="0"/>
+              <a:buNone/>
+              <a:defRPr sz="1600" kern="1200">
+                <a:solidFill>
+                  <a:schemeClr val="tx1"/>
+                </a:solidFill>
+                <a:latin typeface="+mn-lt"/>
+                <a:ea typeface="+mn-ea"/>
+                <a:cs typeface="+mn-cs"/>
+              </a:defRPr>
+            </a:lvl9pPr>
+          </a:lstStyle>
+          <a:p>
+            <a:pPr marL="342900" indent="-342900" algn="l">
+              <a:buFont typeface="Arial" panose="020B0604020202020204" pitchFamily="34" charset="0"/>
+              <a:buChar char="•"/>
+            </a:pPr>
+            <a:r>
+              <a:rPr lang="en-US" dirty="0"/>
+              <a:t>Can also display the average progression of other groups.</a:t>
+            </a:r>
+          </a:p>
+          <a:p>
+            <a:pPr marL="342900" indent="-342900" algn="l">
+              <a:buFont typeface="Arial" panose="020B0604020202020204" pitchFamily="34" charset="0"/>
+              <a:buChar char="•"/>
+            </a:pPr>
+            <a:endParaRPr lang="en-US" dirty="0"/>
+          </a:p>
+          <a:p>
+            <a:pPr marL="342900" indent="-342900" algn="l">
+              <a:buFont typeface="Arial" panose="020B0604020202020204" pitchFamily="34" charset="0"/>
+              <a:buChar char="•"/>
+            </a:pPr>
+            <a:r>
+              <a:rPr lang="en-US" dirty="0"/>
+              <a:t>Can also be shown with individual progress for comparison purposes.</a:t>
+            </a:r>
+          </a:p>
+          <a:p>
+            <a:pPr marL="342900" indent="-342900" algn="l">
+              <a:buFont typeface="Arial" panose="020B0604020202020204" pitchFamily="34" charset="0"/>
+              <a:buChar char="•"/>
+            </a:pPr>
+            <a:endParaRPr lang="en-US" dirty="0"/>
+          </a:p>
+          <a:p>
+            <a:pPr marL="342900" indent="-342900" algn="l">
+              <a:buFont typeface="Arial" panose="020B0604020202020204" pitchFamily="34" charset="0"/>
+              <a:buChar char="•"/>
+            </a:pPr>
+            <a:r>
+              <a:rPr lang="en-US" dirty="0"/>
+              <a:t>This can be used to develop a model of possible success.</a:t>
+            </a:r>
+          </a:p>
+          <a:p>
+            <a:pPr marL="342900" indent="-342900" algn="l">
+              <a:buFont typeface="Arial" panose="020B0604020202020204" pitchFamily="34" charset="0"/>
+              <a:buChar char="•"/>
+            </a:pPr>
+            <a:endParaRPr lang="en-US" dirty="0"/>
+          </a:p>
+          <a:p>
+            <a:pPr algn="l"/>
+            <a:endParaRPr lang="en-US" dirty="0"/>
+          </a:p>
+          <a:p>
+            <a:pPr marL="342900" indent="-342900" algn="l">
+              <a:buFont typeface="Arial" panose="020B0604020202020204" pitchFamily="34" charset="0"/>
+              <a:buChar char="•"/>
+            </a:pPr>
+            <a:endParaRPr lang="en-US" dirty="0"/>
+          </a:p>
+        </p:txBody>
+      </p:sp>
+      <p:sp>
+        <p:nvSpPr>
+          <p:cNvPr id="8" name="Content Placeholder 2">
+            <a:extLst>
+              <a:ext uri="{FF2B5EF4-FFF2-40B4-BE49-F238E27FC236}">
+                <a16:creationId xmlns:a16="http://schemas.microsoft.com/office/drawing/2014/main" id="{2869FE95-312B-45E4-A5AB-D5121DA23669}"/>
+              </a:ext>
+            </a:extLst>
+          </p:cNvPr>
+          <p:cNvSpPr txBox="1">
+            <a:spLocks/>
+          </p:cNvSpPr>
+          <p:nvPr/>
+        </p:nvSpPr>
+        <p:spPr>
+          <a:xfrm>
+            <a:off x="9174692" y="6176963"/>
+            <a:ext cx="2754086" cy="558140"/>
+          </a:xfrm>
+          <a:prstGeom prst="rect">
+            <a:avLst/>
+          </a:prstGeom>
+        </p:spPr>
+        <p:txBody>
+          <a:bodyPr vert="horz" lIns="91440" tIns="45720" rIns="91440" bIns="45720" rtlCol="0">
+            <a:normAutofit/>
+          </a:bodyPr>
+          <a:lstStyle>
+            <a:lvl1pPr marL="228600" indent="-228600" algn="l" defTabSz="914400" rtl="0" eaLnBrk="1" latinLnBrk="0" hangingPunct="1">
+              <a:lnSpc>
+                <a:spcPct val="90000"/>
+              </a:lnSpc>
+              <a:spcBef>
+                <a:spcPts val="1000"/>
+              </a:spcBef>
+              <a:buFont typeface="Arial" panose="020B0604020202020204" pitchFamily="34" charset="0"/>
+              <a:buChar char="•"/>
+              <a:defRPr sz="2800" kern="1200">
+                <a:solidFill>
+                  <a:schemeClr val="tx1"/>
+                </a:solidFill>
+                <a:latin typeface="+mn-lt"/>
+                <a:ea typeface="+mn-ea"/>
+                <a:cs typeface="+mn-cs"/>
+              </a:defRPr>
+            </a:lvl1pPr>
+            <a:lvl2pPr marL="685800" indent="-228600" algn="l" defTabSz="914400" rtl="0" eaLnBrk="1" latinLnBrk="0" hangingPunct="1">
+              <a:lnSpc>
+                <a:spcPct val="90000"/>
+              </a:lnSpc>
+              <a:spcBef>
+                <a:spcPts val="500"/>
+              </a:spcBef>
+              <a:buFont typeface="Arial" panose="020B0604020202020204" pitchFamily="34" charset="0"/>
+              <a:buChar char="•"/>
+              <a:defRPr sz="2400" kern="1200">
+                <a:solidFill>
+                  <a:schemeClr val="tx1"/>
+                </a:solidFill>
+                <a:latin typeface="+mn-lt"/>
+                <a:ea typeface="+mn-ea"/>
+                <a:cs typeface="+mn-cs"/>
+              </a:defRPr>
+            </a:lvl2pPr>
+            <a:lvl3pPr marL="1143000" indent="-228600" algn="l" defTabSz="914400" rtl="0" eaLnBrk="1" latinLnBrk="0" hangingPunct="1">
+              <a:lnSpc>
+                <a:spcPct val="90000"/>
+              </a:lnSpc>
+              <a:spcBef>
+                <a:spcPts val="500"/>
+              </a:spcBef>
+              <a:buFont typeface="Arial" panose="020B0604020202020204" pitchFamily="34" charset="0"/>
+              <a:buChar char="•"/>
+              <a:defRPr sz="2000" kern="1200">
+                <a:solidFill>
+                  <a:schemeClr val="tx1"/>
+                </a:solidFill>
+                <a:latin typeface="+mn-lt"/>
+                <a:ea typeface="+mn-ea"/>
+                <a:cs typeface="+mn-cs"/>
+              </a:defRPr>
+            </a:lvl3pPr>
+            <a:lvl4pPr marL="1600200" indent="-228600" algn="l" defTabSz="914400" rtl="0" eaLnBrk="1" latinLnBrk="0" hangingPunct="1">
+              <a:lnSpc>
+                <a:spcPct val="90000"/>
+              </a:lnSpc>
+              <a:spcBef>
+                <a:spcPts val="500"/>
+              </a:spcBef>
+              <a:buFont typeface="Arial" panose="020B0604020202020204" pitchFamily="34" charset="0"/>
+              <a:buChar char="•"/>
+              <a:defRPr sz="1800" kern="1200">
+                <a:solidFill>
+                  <a:schemeClr val="tx1"/>
+                </a:solidFill>
+                <a:latin typeface="+mn-lt"/>
+                <a:ea typeface="+mn-ea"/>
+                <a:cs typeface="+mn-cs"/>
+              </a:defRPr>
+            </a:lvl4pPr>
+            <a:lvl5pPr marL="2057400" indent="-228600" algn="l" defTabSz="914400" rtl="0" eaLnBrk="1" latinLnBrk="0" hangingPunct="1">
+              <a:lnSpc>
+                <a:spcPct val="90000"/>
+              </a:lnSpc>
+              <a:spcBef>
+                <a:spcPts val="500"/>
+              </a:spcBef>
+              <a:buFont typeface="Arial" panose="020B0604020202020204" pitchFamily="34" charset="0"/>
+              <a:buChar char="•"/>
+              <a:defRPr sz="1800" kern="1200">
+                <a:solidFill>
+                  <a:schemeClr val="tx1"/>
+                </a:solidFill>
+                <a:latin typeface="+mn-lt"/>
+                <a:ea typeface="+mn-ea"/>
+                <a:cs typeface="+mn-cs"/>
+              </a:defRPr>
+            </a:lvl5pPr>
+            <a:lvl6pPr marL="2514600" indent="-228600" algn="l" defTabSz="914400" rtl="0" eaLnBrk="1" latinLnBrk="0" hangingPunct="1">
+              <a:lnSpc>
+                <a:spcPct val="90000"/>
+              </a:lnSpc>
+              <a:spcBef>
+                <a:spcPts val="500"/>
+              </a:spcBef>
+              <a:buFont typeface="Arial" panose="020B0604020202020204" pitchFamily="34" charset="0"/>
+              <a:buChar char="•"/>
+              <a:defRPr sz="1800" kern="1200">
+                <a:solidFill>
+                  <a:schemeClr val="tx1"/>
+                </a:solidFill>
+                <a:latin typeface="+mn-lt"/>
+                <a:ea typeface="+mn-ea"/>
+                <a:cs typeface="+mn-cs"/>
+              </a:defRPr>
+            </a:lvl6pPr>
+            <a:lvl7pPr marL="2971800" indent="-228600" algn="l" defTabSz="914400" rtl="0" eaLnBrk="1" latinLnBrk="0" hangingPunct="1">
+              <a:lnSpc>
+                <a:spcPct val="90000"/>
+              </a:lnSpc>
+              <a:spcBef>
+                <a:spcPts val="500"/>
+              </a:spcBef>
+              <a:buFont typeface="Arial" panose="020B0604020202020204" pitchFamily="34" charset="0"/>
+              <a:buChar char="•"/>
+              <a:defRPr sz="1800" kern="1200">
+                <a:solidFill>
+                  <a:schemeClr val="tx1"/>
+                </a:solidFill>
+                <a:latin typeface="+mn-lt"/>
+                <a:ea typeface="+mn-ea"/>
+                <a:cs typeface="+mn-cs"/>
+              </a:defRPr>
+            </a:lvl7pPr>
+            <a:lvl8pPr marL="3429000" indent="-228600" algn="l" defTabSz="914400" rtl="0" eaLnBrk="1" latinLnBrk="0" hangingPunct="1">
+              <a:lnSpc>
+                <a:spcPct val="90000"/>
+              </a:lnSpc>
+              <a:spcBef>
+                <a:spcPts val="500"/>
+              </a:spcBef>
+              <a:buFont typeface="Arial" panose="020B0604020202020204" pitchFamily="34" charset="0"/>
+              <a:buChar char="•"/>
+              <a:defRPr sz="1800" kern="1200">
+                <a:solidFill>
+                  <a:schemeClr val="tx1"/>
+                </a:solidFill>
+                <a:latin typeface="+mn-lt"/>
+                <a:ea typeface="+mn-ea"/>
+                <a:cs typeface="+mn-cs"/>
+              </a:defRPr>
+            </a:lvl8pPr>
+            <a:lvl9pPr marL="3886200" indent="-228600" algn="l" defTabSz="914400" rtl="0" eaLnBrk="1" latinLnBrk="0" hangingPunct="1">
+              <a:lnSpc>
+                <a:spcPct val="90000"/>
+              </a:lnSpc>
+              <a:spcBef>
+                <a:spcPts val="500"/>
+              </a:spcBef>
+              <a:buFont typeface="Arial" panose="020B0604020202020204" pitchFamily="34" charset="0"/>
+              <a:buChar char="•"/>
+              <a:defRPr sz="1800" kern="1200">
+                <a:solidFill>
+                  <a:schemeClr val="tx1"/>
+                </a:solidFill>
+                <a:latin typeface="+mn-lt"/>
+                <a:ea typeface="+mn-ea"/>
+                <a:cs typeface="+mn-cs"/>
+              </a:defRPr>
+            </a:lvl9pPr>
+          </a:lstStyle>
+          <a:p>
+            <a:pPr marL="0" indent="0">
+              <a:buFont typeface="Arial" panose="020B0604020202020204" pitchFamily="34" charset="0"/>
+              <a:buNone/>
+            </a:pPr>
+            <a:r>
+              <a:rPr lang="en-US"/>
+              <a:t>Garrick Bruening</a:t>
+            </a:r>
+            <a:endParaRPr lang="en-US" dirty="0"/>
+          </a:p>
+        </p:txBody>
+      </p:sp>
       <p:pic>
         <p:nvPicPr>
-          <p:cNvPr id="5" name="Content Placeholder 4" descr="Chart&#10;&#10;Description automatically generated">
+          <p:cNvPr id="18" name="Picture 17" descr="A screenshot of a computer&#10;&#10;Description automatically generated with medium confidence">
             <a:extLst>
               <a:ext uri="{FF2B5EF4-FFF2-40B4-BE49-F238E27FC236}">
-                <a16:creationId xmlns:a16="http://schemas.microsoft.com/office/drawing/2014/main" id="{CF056CBB-F83F-403F-9F2E-E434F1E00CA0}"/>
+                <a16:creationId xmlns:a16="http://schemas.microsoft.com/office/drawing/2014/main" id="{AC35C490-8479-4944-B97B-8B3E2874EE84}"/>
               </a:ext>
             </a:extLst>
           </p:cNvPr>
           <p:cNvPicPr>
-            <a:picLocks noGrp="1" noChangeAspect="1"/>
+            <a:picLocks noChangeAspect="1"/>
           </p:cNvPicPr>
-          <p:nvPr>
-            <p:ph idx="1"/>
-          </p:nvPr>
+          <p:nvPr/>
         </p:nvPicPr>
         <p:blipFill>
           <a:blip r:embed="rId2">
@@ -4780,527 +5973,117 @@
         </p:blipFill>
         <p:spPr>
           <a:xfrm>
-            <a:off x="5005839" y="1370325"/>
-            <a:ext cx="6724412" cy="4980253"/>
-          </a:xfrm>
-        </p:spPr>
-      </p:pic>
-      <p:sp>
-        <p:nvSpPr>
-          <p:cNvPr id="6" name="Title 1">
-            <a:extLst>
-              <a:ext uri="{FF2B5EF4-FFF2-40B4-BE49-F238E27FC236}">
-                <a16:creationId xmlns:a16="http://schemas.microsoft.com/office/drawing/2014/main" id="{07D9BA98-FBA7-400E-B659-CE08722F4086}"/>
-              </a:ext>
-            </a:extLst>
-          </p:cNvPr>
-          <p:cNvSpPr txBox="1">
-            <a:spLocks/>
-          </p:cNvSpPr>
-          <p:nvPr/>
-        </p:nvSpPr>
-        <p:spPr>
-          <a:xfrm>
-            <a:off x="468365" y="244766"/>
-            <a:ext cx="6025877" cy="872542"/>
+            <a:off x="6743699" y="1361935"/>
+            <a:ext cx="3808036" cy="1825203"/>
           </a:xfrm>
           <a:prstGeom prst="rect">
             <a:avLst/>
           </a:prstGeom>
         </p:spPr>
-        <p:txBody>
-          <a:bodyPr vert="horz" lIns="91440" tIns="45720" rIns="91440" bIns="45720" rtlCol="0" anchor="b">
-            <a:normAutofit fontScale="77500" lnSpcReduction="20000"/>
-          </a:bodyPr>
-          <a:lstStyle>
-            <a:lvl1pPr algn="ctr" defTabSz="914400" rtl="0" eaLnBrk="1" latinLnBrk="0" hangingPunct="1">
-              <a:lnSpc>
-                <a:spcPct val="90000"/>
-              </a:lnSpc>
-              <a:spcBef>
-                <a:spcPct val="0"/>
-              </a:spcBef>
-              <a:buNone/>
-              <a:defRPr sz="6000" kern="1200">
-                <a:solidFill>
-                  <a:schemeClr val="tx1"/>
-                </a:solidFill>
-                <a:latin typeface="+mj-lt"/>
-                <a:ea typeface="+mj-ea"/>
-                <a:cs typeface="+mj-cs"/>
-              </a:defRPr>
-            </a:lvl1pPr>
-          </a:lstStyle>
-          <a:p>
-            <a:pPr algn="l"/>
-            <a:r>
-              <a:rPr lang="en-US" dirty="0">
-                <a:solidFill>
-                  <a:srgbClr val="FFCC00"/>
-                </a:solidFill>
-                <a:latin typeface="+mn-lt"/>
-              </a:rPr>
-              <a:t>Aggregated Group data</a:t>
-            </a:r>
-          </a:p>
-        </p:txBody>
-      </p:sp>
-      <p:sp>
-        <p:nvSpPr>
-          <p:cNvPr id="7" name="Content Placeholder 2">
+      </p:pic>
+      <p:pic>
+        <p:nvPicPr>
+          <p:cNvPr id="20" name="Picture 19" descr="A screenshot of a computer&#10;&#10;Description automatically generated with medium confidence">
             <a:extLst>
               <a:ext uri="{FF2B5EF4-FFF2-40B4-BE49-F238E27FC236}">
-                <a16:creationId xmlns:a16="http://schemas.microsoft.com/office/drawing/2014/main" id="{C12F1A20-35FC-44A7-8F84-3A695133EDA2}"/>
+                <a16:creationId xmlns:a16="http://schemas.microsoft.com/office/drawing/2014/main" id="{2C764DA9-E55D-41C9-8DAF-88B197893F68}"/>
               </a:ext>
             </a:extLst>
           </p:cNvPr>
-          <p:cNvSpPr txBox="1">
-            <a:spLocks/>
-          </p:cNvSpPr>
+          <p:cNvPicPr>
+            <a:picLocks noChangeAspect="1"/>
+          </p:cNvPicPr>
           <p:nvPr/>
-        </p:nvSpPr>
+        </p:nvPicPr>
+        <p:blipFill>
+          <a:blip r:embed="rId3">
+            <a:extLst>
+              <a:ext uri="{28A0092B-C50C-407E-A947-70E740481C1C}">
+                <a14:useLocalDpi xmlns:a14="http://schemas.microsoft.com/office/drawing/2010/main" val="0"/>
+              </a:ext>
+            </a:extLst>
+          </a:blip>
+          <a:stretch>
+            <a:fillRect/>
+          </a:stretch>
+        </p:blipFill>
         <p:spPr>
           <a:xfrm>
-            <a:off x="838200" y="1717720"/>
-            <a:ext cx="3628121" cy="4282611"/>
+            <a:off x="6743699" y="3635497"/>
+            <a:ext cx="3808035" cy="2422919"/>
           </a:xfrm>
           <a:prstGeom prst="rect">
             <a:avLst/>
           </a:prstGeom>
         </p:spPr>
-        <p:txBody>
-          <a:bodyPr vert="horz" lIns="91440" tIns="45720" rIns="91440" bIns="45720" rtlCol="0">
-            <a:normAutofit/>
-          </a:bodyPr>
-          <a:lstStyle>
-            <a:lvl1pPr marL="0" indent="0" algn="ctr" defTabSz="914400" rtl="0" eaLnBrk="1" latinLnBrk="0" hangingPunct="1">
-              <a:lnSpc>
-                <a:spcPct val="90000"/>
-              </a:lnSpc>
-              <a:spcBef>
-                <a:spcPts val="1000"/>
-              </a:spcBef>
-              <a:buFont typeface="Arial" panose="020B0604020202020204" pitchFamily="34" charset="0"/>
-              <a:buNone/>
-              <a:defRPr sz="2400" kern="1200">
-                <a:solidFill>
-                  <a:schemeClr val="tx1"/>
-                </a:solidFill>
-                <a:latin typeface="+mn-lt"/>
-                <a:ea typeface="+mn-ea"/>
-                <a:cs typeface="+mn-cs"/>
-              </a:defRPr>
-            </a:lvl1pPr>
-            <a:lvl2pPr marL="457200" indent="0" algn="ctr" defTabSz="914400" rtl="0" eaLnBrk="1" latinLnBrk="0" hangingPunct="1">
-              <a:lnSpc>
-                <a:spcPct val="90000"/>
-              </a:lnSpc>
-              <a:spcBef>
-                <a:spcPts val="500"/>
-              </a:spcBef>
-              <a:buFont typeface="Arial" panose="020B0604020202020204" pitchFamily="34" charset="0"/>
-              <a:buNone/>
-              <a:defRPr sz="2000" kern="1200">
-                <a:solidFill>
-                  <a:schemeClr val="tx1"/>
-                </a:solidFill>
-                <a:latin typeface="+mn-lt"/>
-                <a:ea typeface="+mn-ea"/>
-                <a:cs typeface="+mn-cs"/>
-              </a:defRPr>
-            </a:lvl2pPr>
-            <a:lvl3pPr marL="914400" indent="0" algn="ctr" defTabSz="914400" rtl="0" eaLnBrk="1" latinLnBrk="0" hangingPunct="1">
-              <a:lnSpc>
-                <a:spcPct val="90000"/>
-              </a:lnSpc>
-              <a:spcBef>
-                <a:spcPts val="500"/>
-              </a:spcBef>
-              <a:buFont typeface="Arial" panose="020B0604020202020204" pitchFamily="34" charset="0"/>
-              <a:buNone/>
-              <a:defRPr sz="1800" kern="1200">
-                <a:solidFill>
-                  <a:schemeClr val="tx1"/>
-                </a:solidFill>
-                <a:latin typeface="+mn-lt"/>
-                <a:ea typeface="+mn-ea"/>
-                <a:cs typeface="+mn-cs"/>
-              </a:defRPr>
-            </a:lvl3pPr>
-            <a:lvl4pPr marL="1371600" indent="0" algn="ctr" defTabSz="914400" rtl="0" eaLnBrk="1" latinLnBrk="0" hangingPunct="1">
-              <a:lnSpc>
-                <a:spcPct val="90000"/>
-              </a:lnSpc>
-              <a:spcBef>
-                <a:spcPts val="500"/>
-              </a:spcBef>
-              <a:buFont typeface="Arial" panose="020B0604020202020204" pitchFamily="34" charset="0"/>
-              <a:buNone/>
-              <a:defRPr sz="1600" kern="1200">
-                <a:solidFill>
-                  <a:schemeClr val="tx1"/>
-                </a:solidFill>
-                <a:latin typeface="+mn-lt"/>
-                <a:ea typeface="+mn-ea"/>
-                <a:cs typeface="+mn-cs"/>
-              </a:defRPr>
-            </a:lvl4pPr>
-            <a:lvl5pPr marL="1828800" indent="0" algn="ctr" defTabSz="914400" rtl="0" eaLnBrk="1" latinLnBrk="0" hangingPunct="1">
-              <a:lnSpc>
-                <a:spcPct val="90000"/>
-              </a:lnSpc>
-              <a:spcBef>
-                <a:spcPts val="500"/>
-              </a:spcBef>
-              <a:buFont typeface="Arial" panose="020B0604020202020204" pitchFamily="34" charset="0"/>
-              <a:buNone/>
-              <a:defRPr sz="1600" kern="1200">
-                <a:solidFill>
-                  <a:schemeClr val="tx1"/>
-                </a:solidFill>
-                <a:latin typeface="+mn-lt"/>
-                <a:ea typeface="+mn-ea"/>
-                <a:cs typeface="+mn-cs"/>
-              </a:defRPr>
-            </a:lvl5pPr>
-            <a:lvl6pPr marL="2286000" indent="0" algn="ctr" defTabSz="914400" rtl="0" eaLnBrk="1" latinLnBrk="0" hangingPunct="1">
-              <a:lnSpc>
-                <a:spcPct val="90000"/>
-              </a:lnSpc>
-              <a:spcBef>
-                <a:spcPts val="500"/>
-              </a:spcBef>
-              <a:buFont typeface="Arial" panose="020B0604020202020204" pitchFamily="34" charset="0"/>
-              <a:buNone/>
-              <a:defRPr sz="1600" kern="1200">
-                <a:solidFill>
-                  <a:schemeClr val="tx1"/>
-                </a:solidFill>
-                <a:latin typeface="+mn-lt"/>
-                <a:ea typeface="+mn-ea"/>
-                <a:cs typeface="+mn-cs"/>
-              </a:defRPr>
-            </a:lvl6pPr>
-            <a:lvl7pPr marL="2743200" indent="0" algn="ctr" defTabSz="914400" rtl="0" eaLnBrk="1" latinLnBrk="0" hangingPunct="1">
-              <a:lnSpc>
-                <a:spcPct val="90000"/>
-              </a:lnSpc>
-              <a:spcBef>
-                <a:spcPts val="500"/>
-              </a:spcBef>
-              <a:buFont typeface="Arial" panose="020B0604020202020204" pitchFamily="34" charset="0"/>
-              <a:buNone/>
-              <a:defRPr sz="1600" kern="1200">
-                <a:solidFill>
-                  <a:schemeClr val="tx1"/>
-                </a:solidFill>
-                <a:latin typeface="+mn-lt"/>
-                <a:ea typeface="+mn-ea"/>
-                <a:cs typeface="+mn-cs"/>
-              </a:defRPr>
-            </a:lvl7pPr>
-            <a:lvl8pPr marL="3200400" indent="0" algn="ctr" defTabSz="914400" rtl="0" eaLnBrk="1" latinLnBrk="0" hangingPunct="1">
-              <a:lnSpc>
-                <a:spcPct val="90000"/>
-              </a:lnSpc>
-              <a:spcBef>
-                <a:spcPts val="500"/>
-              </a:spcBef>
-              <a:buFont typeface="Arial" panose="020B0604020202020204" pitchFamily="34" charset="0"/>
-              <a:buNone/>
-              <a:defRPr sz="1600" kern="1200">
-                <a:solidFill>
-                  <a:schemeClr val="tx1"/>
-                </a:solidFill>
-                <a:latin typeface="+mn-lt"/>
-                <a:ea typeface="+mn-ea"/>
-                <a:cs typeface="+mn-cs"/>
-              </a:defRPr>
-            </a:lvl8pPr>
-            <a:lvl9pPr marL="3657600" indent="0" algn="ctr" defTabSz="914400" rtl="0" eaLnBrk="1" latinLnBrk="0" hangingPunct="1">
-              <a:lnSpc>
-                <a:spcPct val="90000"/>
-              </a:lnSpc>
-              <a:spcBef>
-                <a:spcPts val="500"/>
-              </a:spcBef>
-              <a:buFont typeface="Arial" panose="020B0604020202020204" pitchFamily="34" charset="0"/>
-              <a:buNone/>
-              <a:defRPr sz="1600" kern="1200">
-                <a:solidFill>
-                  <a:schemeClr val="tx1"/>
-                </a:solidFill>
-                <a:latin typeface="+mn-lt"/>
-                <a:ea typeface="+mn-ea"/>
-                <a:cs typeface="+mn-cs"/>
-              </a:defRPr>
-            </a:lvl9pPr>
-          </a:lstStyle>
-          <a:p>
-            <a:pPr marL="342900" indent="-342900" algn="l">
-              <a:buFont typeface="Arial" panose="020B0604020202020204" pitchFamily="34" charset="0"/>
-              <a:buChar char="•"/>
-            </a:pPr>
-            <a:r>
-              <a:rPr lang="en-US" dirty="0"/>
-              <a:t>Can also display the average progression of other groups.</a:t>
-            </a:r>
-          </a:p>
-          <a:p>
-            <a:pPr marL="342900" indent="-342900" algn="l">
-              <a:buFont typeface="Arial" panose="020B0604020202020204" pitchFamily="34" charset="0"/>
-              <a:buChar char="•"/>
-            </a:pPr>
-            <a:endParaRPr lang="en-US" dirty="0"/>
-          </a:p>
-          <a:p>
-            <a:pPr marL="342900" indent="-342900" algn="l">
-              <a:buFont typeface="Arial" panose="020B0604020202020204" pitchFamily="34" charset="0"/>
-              <a:buChar char="•"/>
-            </a:pPr>
-            <a:r>
-              <a:rPr lang="en-US" dirty="0"/>
-              <a:t>Can also be shown with individual progress for comparison purposes.</a:t>
-            </a:r>
-          </a:p>
-          <a:p>
-            <a:pPr marL="342900" indent="-342900" algn="l">
-              <a:buFont typeface="Arial" panose="020B0604020202020204" pitchFamily="34" charset="0"/>
-              <a:buChar char="•"/>
-            </a:pPr>
-            <a:endParaRPr lang="en-US" dirty="0"/>
-          </a:p>
-          <a:p>
-            <a:pPr marL="342900" indent="-342900" algn="l">
-              <a:buFont typeface="Arial" panose="020B0604020202020204" pitchFamily="34" charset="0"/>
-              <a:buChar char="•"/>
-            </a:pPr>
-            <a:r>
-              <a:rPr lang="en-US" dirty="0"/>
-              <a:t>This can be used to develop a model of possible success.</a:t>
-            </a:r>
-          </a:p>
-          <a:p>
-            <a:pPr marL="342900" indent="-342900" algn="l">
-              <a:buFont typeface="Arial" panose="020B0604020202020204" pitchFamily="34" charset="0"/>
-              <a:buChar char="•"/>
-            </a:pPr>
-            <a:endParaRPr lang="en-US" dirty="0"/>
-          </a:p>
-          <a:p>
-            <a:pPr algn="l"/>
-            <a:endParaRPr lang="en-US" dirty="0"/>
-          </a:p>
-          <a:p>
-            <a:pPr marL="342900" indent="-342900" algn="l">
-              <a:buFont typeface="Arial" panose="020B0604020202020204" pitchFamily="34" charset="0"/>
-              <a:buChar char="•"/>
-            </a:pPr>
-            <a:endParaRPr lang="en-US" dirty="0"/>
-          </a:p>
-        </p:txBody>
-      </p:sp>
-      <p:sp>
-        <p:nvSpPr>
-          <p:cNvPr id="8" name="Content Placeholder 2">
+      </p:pic>
+      <p:sp>
+        <p:nvSpPr>
+          <p:cNvPr id="22" name="TextBox 21">
             <a:extLst>
               <a:ext uri="{FF2B5EF4-FFF2-40B4-BE49-F238E27FC236}">
-                <a16:creationId xmlns:a16="http://schemas.microsoft.com/office/drawing/2014/main" id="{2869FE95-312B-45E4-A5AB-D5121DA23669}"/>
+                <a16:creationId xmlns:a16="http://schemas.microsoft.com/office/drawing/2014/main" id="{DDC93BE0-52C7-4455-836D-9F6DF5A19566}"/>
               </a:ext>
             </a:extLst>
           </p:cNvPr>
-          <p:cNvSpPr txBox="1">
-            <a:spLocks/>
-          </p:cNvSpPr>
+          <p:cNvSpPr txBox="1"/>
           <p:nvPr/>
         </p:nvSpPr>
         <p:spPr>
           <a:xfrm>
-            <a:off x="9174692" y="6176963"/>
-            <a:ext cx="2754086" cy="558140"/>
+            <a:off x="6638925" y="1058865"/>
+            <a:ext cx="6096000" cy="369332"/>
           </a:xfrm>
           <a:prstGeom prst="rect">
             <a:avLst/>
           </a:prstGeom>
+          <a:noFill/>
         </p:spPr>
         <p:txBody>
-          <a:bodyPr vert="horz" lIns="91440" tIns="45720" rIns="91440" bIns="45720" rtlCol="0">
-            <a:normAutofit/>
+          <a:bodyPr wrap="square">
+            <a:spAutoFit/>
           </a:bodyPr>
-          <a:lstStyle>
-            <a:lvl1pPr marL="228600" indent="-228600" algn="l" defTabSz="914400" rtl="0" eaLnBrk="1" latinLnBrk="0" hangingPunct="1">
-              <a:lnSpc>
-                <a:spcPct val="90000"/>
-              </a:lnSpc>
-              <a:spcBef>
-                <a:spcPts val="1000"/>
-              </a:spcBef>
-              <a:buFont typeface="Arial" panose="020B0604020202020204" pitchFamily="34" charset="0"/>
-              <a:buChar char="•"/>
-              <a:defRPr sz="2800" kern="1200">
-                <a:solidFill>
-                  <a:schemeClr val="tx1"/>
-                </a:solidFill>
-                <a:latin typeface="+mn-lt"/>
-                <a:ea typeface="+mn-ea"/>
-                <a:cs typeface="+mn-cs"/>
-              </a:defRPr>
-            </a:lvl1pPr>
-            <a:lvl2pPr marL="685800" indent="-228600" algn="l" defTabSz="914400" rtl="0" eaLnBrk="1" latinLnBrk="0" hangingPunct="1">
-              <a:lnSpc>
-                <a:spcPct val="90000"/>
-              </a:lnSpc>
-              <a:spcBef>
-                <a:spcPts val="500"/>
-              </a:spcBef>
-              <a:buFont typeface="Arial" panose="020B0604020202020204" pitchFamily="34" charset="0"/>
-              <a:buChar char="•"/>
-              <a:defRPr sz="2400" kern="1200">
-                <a:solidFill>
-                  <a:schemeClr val="tx1"/>
-                </a:solidFill>
-                <a:latin typeface="+mn-lt"/>
-                <a:ea typeface="+mn-ea"/>
-                <a:cs typeface="+mn-cs"/>
-              </a:defRPr>
-            </a:lvl2pPr>
-            <a:lvl3pPr marL="1143000" indent="-228600" algn="l" defTabSz="914400" rtl="0" eaLnBrk="1" latinLnBrk="0" hangingPunct="1">
-              <a:lnSpc>
-                <a:spcPct val="90000"/>
-              </a:lnSpc>
-              <a:spcBef>
-                <a:spcPts val="500"/>
-              </a:spcBef>
-              <a:buFont typeface="Arial" panose="020B0604020202020204" pitchFamily="34" charset="0"/>
-              <a:buChar char="•"/>
-              <a:defRPr sz="2000" kern="1200">
-                <a:solidFill>
-                  <a:schemeClr val="tx1"/>
-                </a:solidFill>
-                <a:latin typeface="+mn-lt"/>
-                <a:ea typeface="+mn-ea"/>
-                <a:cs typeface="+mn-cs"/>
-              </a:defRPr>
-            </a:lvl3pPr>
-            <a:lvl4pPr marL="1600200" indent="-228600" algn="l" defTabSz="914400" rtl="0" eaLnBrk="1" latinLnBrk="0" hangingPunct="1">
-              <a:lnSpc>
-                <a:spcPct val="90000"/>
-              </a:lnSpc>
-              <a:spcBef>
-                <a:spcPts val="500"/>
-              </a:spcBef>
-              <a:buFont typeface="Arial" panose="020B0604020202020204" pitchFamily="34" charset="0"/>
-              <a:buChar char="•"/>
-              <a:defRPr sz="1800" kern="1200">
-                <a:solidFill>
-                  <a:schemeClr val="tx1"/>
-                </a:solidFill>
-                <a:latin typeface="+mn-lt"/>
-                <a:ea typeface="+mn-ea"/>
-                <a:cs typeface="+mn-cs"/>
-              </a:defRPr>
-            </a:lvl4pPr>
-            <a:lvl5pPr marL="2057400" indent="-228600" algn="l" defTabSz="914400" rtl="0" eaLnBrk="1" latinLnBrk="0" hangingPunct="1">
-              <a:lnSpc>
-                <a:spcPct val="90000"/>
-              </a:lnSpc>
-              <a:spcBef>
-                <a:spcPts val="500"/>
-              </a:spcBef>
-              <a:buFont typeface="Arial" panose="020B0604020202020204" pitchFamily="34" charset="0"/>
-              <a:buChar char="•"/>
-              <a:defRPr sz="1800" kern="1200">
-                <a:solidFill>
-                  <a:schemeClr val="tx1"/>
-                </a:solidFill>
-                <a:latin typeface="+mn-lt"/>
-                <a:ea typeface="+mn-ea"/>
-                <a:cs typeface="+mn-cs"/>
-              </a:defRPr>
-            </a:lvl5pPr>
-            <a:lvl6pPr marL="2514600" indent="-228600" algn="l" defTabSz="914400" rtl="0" eaLnBrk="1" latinLnBrk="0" hangingPunct="1">
-              <a:lnSpc>
-                <a:spcPct val="90000"/>
-              </a:lnSpc>
-              <a:spcBef>
-                <a:spcPts val="500"/>
-              </a:spcBef>
-              <a:buFont typeface="Arial" panose="020B0604020202020204" pitchFamily="34" charset="0"/>
-              <a:buChar char="•"/>
-              <a:defRPr sz="1800" kern="1200">
-                <a:solidFill>
-                  <a:schemeClr val="tx1"/>
-                </a:solidFill>
-                <a:latin typeface="+mn-lt"/>
-                <a:ea typeface="+mn-ea"/>
-                <a:cs typeface="+mn-cs"/>
-              </a:defRPr>
-            </a:lvl6pPr>
-            <a:lvl7pPr marL="2971800" indent="-228600" algn="l" defTabSz="914400" rtl="0" eaLnBrk="1" latinLnBrk="0" hangingPunct="1">
-              <a:lnSpc>
-                <a:spcPct val="90000"/>
-              </a:lnSpc>
-              <a:spcBef>
-                <a:spcPts val="500"/>
-              </a:spcBef>
-              <a:buFont typeface="Arial" panose="020B0604020202020204" pitchFamily="34" charset="0"/>
-              <a:buChar char="•"/>
-              <a:defRPr sz="1800" kern="1200">
-                <a:solidFill>
-                  <a:schemeClr val="tx1"/>
-                </a:solidFill>
-                <a:latin typeface="+mn-lt"/>
-                <a:ea typeface="+mn-ea"/>
-                <a:cs typeface="+mn-cs"/>
-              </a:defRPr>
-            </a:lvl7pPr>
-            <a:lvl8pPr marL="3429000" indent="-228600" algn="l" defTabSz="914400" rtl="0" eaLnBrk="1" latinLnBrk="0" hangingPunct="1">
-              <a:lnSpc>
-                <a:spcPct val="90000"/>
-              </a:lnSpc>
-              <a:spcBef>
-                <a:spcPts val="500"/>
-              </a:spcBef>
-              <a:buFont typeface="Arial" panose="020B0604020202020204" pitchFamily="34" charset="0"/>
-              <a:buChar char="•"/>
-              <a:defRPr sz="1800" kern="1200">
-                <a:solidFill>
-                  <a:schemeClr val="tx1"/>
-                </a:solidFill>
-                <a:latin typeface="+mn-lt"/>
-                <a:ea typeface="+mn-ea"/>
-                <a:cs typeface="+mn-cs"/>
-              </a:defRPr>
-            </a:lvl8pPr>
-            <a:lvl9pPr marL="3886200" indent="-228600" algn="l" defTabSz="914400" rtl="0" eaLnBrk="1" latinLnBrk="0" hangingPunct="1">
-              <a:lnSpc>
-                <a:spcPct val="90000"/>
-              </a:lnSpc>
-              <a:spcBef>
-                <a:spcPts val="500"/>
-              </a:spcBef>
-              <a:buFont typeface="Arial" panose="020B0604020202020204" pitchFamily="34" charset="0"/>
-              <a:buChar char="•"/>
-              <a:defRPr sz="1800" kern="1200">
-                <a:solidFill>
-                  <a:schemeClr val="tx1"/>
-                </a:solidFill>
-                <a:latin typeface="+mn-lt"/>
-                <a:ea typeface="+mn-ea"/>
-                <a:cs typeface="+mn-cs"/>
-              </a:defRPr>
-            </a:lvl9pPr>
-          </a:lstStyle>
-          <a:p>
-            <a:pPr marL="0" indent="0">
-              <a:buFont typeface="Arial" panose="020B0604020202020204" pitchFamily="34" charset="0"/>
-              <a:buNone/>
-            </a:pPr>
-            <a:r>
-              <a:rPr lang="en-US"/>
-              <a:t>Garrick Bruening</a:t>
-            </a:r>
-            <a:endParaRPr lang="en-US" dirty="0"/>
+          <a:lstStyle/>
+          <a:p>
+            <a:r>
+              <a:rPr lang="en-US" dirty="0"/>
+              <a:t>Histogram of pull counts.</a:t>
+            </a:r>
+          </a:p>
+        </p:txBody>
+      </p:sp>
+      <p:sp>
+        <p:nvSpPr>
+          <p:cNvPr id="23" name="TextBox 22">
+            <a:extLst>
+              <a:ext uri="{FF2B5EF4-FFF2-40B4-BE49-F238E27FC236}">
+                <a16:creationId xmlns:a16="http://schemas.microsoft.com/office/drawing/2014/main" id="{0707B8EA-F935-40AD-80E4-E21A38C39213}"/>
+              </a:ext>
+            </a:extLst>
+          </p:cNvPr>
+          <p:cNvSpPr txBox="1"/>
+          <p:nvPr/>
+        </p:nvSpPr>
+        <p:spPr>
+          <a:xfrm>
+            <a:off x="6638925" y="3342966"/>
+            <a:ext cx="6096000" cy="369332"/>
+          </a:xfrm>
+          <a:prstGeom prst="rect">
+            <a:avLst/>
+          </a:prstGeom>
+          <a:noFill/>
+        </p:spPr>
+        <p:txBody>
+          <a:bodyPr wrap="square">
+            <a:spAutoFit/>
+          </a:bodyPr>
+          <a:lstStyle/>
+          <a:p>
+            <a:r>
+              <a:rPr lang="en-US" dirty="0"/>
+              <a:t>Histogram of progression time.</a:t>
+            </a:r>
           </a:p>
         </p:txBody>
       </p:sp>
@@ -6082,8 +6865,8 @@
         </p:blipFill>
         <p:spPr>
           <a:xfrm>
-            <a:off x="7117036" y="3429000"/>
-            <a:ext cx="2357865" cy="2076118"/>
+            <a:off x="6716986" y="3439500"/>
+            <a:ext cx="3006922" cy="2647618"/>
           </a:xfrm>
           <a:prstGeom prst="rect">
             <a:avLst/>
@@ -6403,4 +7186,299 @@
     </a:ext>
   </a:extLst>
 </a:theme>
+</file>
+
+<file path=ppt/theme/theme2.xml><?xml version="1.0" encoding="utf-8"?>
+<a:theme xmlns:a="http://schemas.openxmlformats.org/drawingml/2006/main" name="Office Theme">
+  <a:themeElements>
+    <a:clrScheme name="Office">
+      <a:dk1>
+        <a:sysClr val="windowText" lastClr="000000"/>
+      </a:dk1>
+      <a:lt1>
+        <a:sysClr val="window" lastClr="FFFFFF"/>
+      </a:lt1>
+      <a:dk2>
+        <a:srgbClr val="44546A"/>
+      </a:dk2>
+      <a:lt2>
+        <a:srgbClr val="E7E6E6"/>
+      </a:lt2>
+      <a:accent1>
+        <a:srgbClr val="4472C4"/>
+      </a:accent1>
+      <a:accent2>
+        <a:srgbClr val="ED7D31"/>
+      </a:accent2>
+      <a:accent3>
+        <a:srgbClr val="A5A5A5"/>
+      </a:accent3>
+      <a:accent4>
+        <a:srgbClr val="FFC000"/>
+      </a:accent4>
+      <a:accent5>
+        <a:srgbClr val="5B9BD5"/>
+      </a:accent5>
+      <a:accent6>
+        <a:srgbClr val="70AD47"/>
+      </a:accent6>
+      <a:hlink>
+        <a:srgbClr val="0563C1"/>
+      </a:hlink>
+      <a:folHlink>
+        <a:srgbClr val="954F72"/>
+      </a:folHlink>
+    </a:clrScheme>
+    <a:fontScheme name="Office">
+      <a:majorFont>
+        <a:latin typeface="Calibri Light" panose="020F0302020204030204"/>
+        <a:ea typeface=""/>
+        <a:cs typeface=""/>
+        <a:font script="Jpan" typeface="游ゴシック Light"/>
+        <a:font script="Hang" typeface="맑은 고딕"/>
+        <a:font script="Hans" typeface="等线 Light"/>
+        <a:font script="Hant" typeface="新細明體"/>
+        <a:font script="Arab" typeface="Times New Roman"/>
+        <a:font script="Hebr" typeface="Times New Roman"/>
+        <a:font script="Thai" typeface="Angsana New"/>
+        <a:font script="Ethi" typeface="Nyala"/>
+        <a:font script="Beng" typeface="Vrinda"/>
+        <a:font script="Gujr" typeface="Shruti"/>
+        <a:font script="Khmr" typeface="MoolBoran"/>
+        <a:font script="Knda" typeface="Tunga"/>
+        <a:font script="Guru" typeface="Raavi"/>
+        <a:font script="Cans" typeface="Euphemia"/>
+        <a:font script="Cher" typeface="Plantagenet Cherokee"/>
+        <a:font script="Yiii" typeface="Microsoft Yi Baiti"/>
+        <a:font script="Tibt" typeface="Microsoft Himalaya"/>
+        <a:font script="Thaa" typeface="MV Boli"/>
+        <a:font script="Deva" typeface="Mangal"/>
+        <a:font script="Telu" typeface="Gautami"/>
+        <a:font script="Taml" typeface="Latha"/>
+        <a:font script="Syrc" typeface="Estrangelo Edessa"/>
+        <a:font script="Orya" typeface="Kalinga"/>
+        <a:font script="Mlym" typeface="Kartika"/>
+        <a:font script="Laoo" typeface="DokChampa"/>
+        <a:font script="Sinh" typeface="Iskoola Pota"/>
+        <a:font script="Mong" typeface="Mongolian Baiti"/>
+        <a:font script="Viet" typeface="Times New Roman"/>
+        <a:font script="Uigh" typeface="Microsoft Uighur"/>
+        <a:font script="Geor" typeface="Sylfaen"/>
+        <a:font script="Armn" typeface="Arial"/>
+        <a:font script="Bugi" typeface="Leelawadee UI"/>
+        <a:font script="Bopo" typeface="Microsoft JhengHei"/>
+        <a:font script="Java" typeface="Javanese Text"/>
+        <a:font script="Lisu" typeface="Segoe UI"/>
+        <a:font script="Mymr" typeface="Myanmar Text"/>
+        <a:font script="Nkoo" typeface="Ebrima"/>
+        <a:font script="Olck" typeface="Nirmala UI"/>
+        <a:font script="Osma" typeface="Ebrima"/>
+        <a:font script="Phag" typeface="Phagspa"/>
+        <a:font script="Syrn" typeface="Estrangelo Edessa"/>
+        <a:font script="Syrj" typeface="Estrangelo Edessa"/>
+        <a:font script="Syre" typeface="Estrangelo Edessa"/>
+        <a:font script="Sora" typeface="Nirmala UI"/>
+        <a:font script="Tale" typeface="Microsoft Tai Le"/>
+        <a:font script="Talu" typeface="Microsoft New Tai Lue"/>
+        <a:font script="Tfng" typeface="Ebrima"/>
+      </a:majorFont>
+      <a:minorFont>
+        <a:latin typeface="Calibri" panose="020F0502020204030204"/>
+        <a:ea typeface=""/>
+        <a:cs typeface=""/>
+        <a:font script="Jpan" typeface="游ゴシック"/>
+        <a:font script="Hang" typeface="맑은 고딕"/>
+        <a:font script="Hans" typeface="等线"/>
+        <a:font script="Hant" typeface="新細明體"/>
+        <a:font script="Arab" typeface="Arial"/>
+        <a:font script="Hebr" typeface="Arial"/>
+        <a:font script="Thai" typeface="Cordia New"/>
+        <a:font script="Ethi" typeface="Nyala"/>
+        <a:font script="Beng" typeface="Vrinda"/>
+        <a:font script="Gujr" typeface="Shruti"/>
+        <a:font script="Khmr" typeface="DaunPenh"/>
+        <a:font script="Knda" typeface="Tunga"/>
+        <a:font script="Guru" typeface="Raavi"/>
+        <a:font script="Cans" typeface="Euphemia"/>
+        <a:font script="Cher" typeface="Plantagenet Cherokee"/>
+        <a:font script="Yiii" typeface="Microsoft Yi Baiti"/>
+        <a:font script="Tibt" typeface="Microsoft Himalaya"/>
+        <a:font script="Thaa" typeface="MV Boli"/>
+        <a:font script="Deva" typeface="Mangal"/>
+        <a:font script="Telu" typeface="Gautami"/>
+        <a:font script="Taml" typeface="Latha"/>
+        <a:font script="Syrc" typeface="Estrangelo Edessa"/>
+        <a:font script="Orya" typeface="Kalinga"/>
+        <a:font script="Mlym" typeface="Kartika"/>
+        <a:font script="Laoo" typeface="DokChampa"/>
+        <a:font script="Sinh" typeface="Iskoola Pota"/>
+        <a:font script="Mong" typeface="Mongolian Baiti"/>
+        <a:font script="Viet" typeface="Arial"/>
+        <a:font script="Uigh" typeface="Microsoft Uighur"/>
+        <a:font script="Geor" typeface="Sylfaen"/>
+        <a:font script="Armn" typeface="Arial"/>
+        <a:font script="Bugi" typeface="Leelawadee UI"/>
+        <a:font script="Bopo" typeface="Microsoft JhengHei"/>
+        <a:font script="Java" typeface="Javanese Text"/>
+        <a:font script="Lisu" typeface="Segoe UI"/>
+        <a:font script="Mymr" typeface="Myanmar Text"/>
+        <a:font script="Nkoo" typeface="Ebrima"/>
+        <a:font script="Olck" typeface="Nirmala UI"/>
+        <a:font script="Osma" typeface="Ebrima"/>
+        <a:font script="Phag" typeface="Phagspa"/>
+        <a:font script="Syrn" typeface="Estrangelo Edessa"/>
+        <a:font script="Syrj" typeface="Estrangelo Edessa"/>
+        <a:font script="Syre" typeface="Estrangelo Edessa"/>
+        <a:font script="Sora" typeface="Nirmala UI"/>
+        <a:font script="Tale" typeface="Microsoft Tai Le"/>
+        <a:font script="Talu" typeface="Microsoft New Tai Lue"/>
+        <a:font script="Tfng" typeface="Ebrima"/>
+      </a:minorFont>
+    </a:fontScheme>
+    <a:fmtScheme name="Office">
+      <a:fillStyleLst>
+        <a:solidFill>
+          <a:schemeClr val="phClr"/>
+        </a:solidFill>
+        <a:gradFill rotWithShape="1">
+          <a:gsLst>
+            <a:gs pos="0">
+              <a:schemeClr val="phClr">
+                <a:lumMod val="110000"/>
+                <a:satMod val="105000"/>
+                <a:tint val="67000"/>
+              </a:schemeClr>
+            </a:gs>
+            <a:gs pos="50000">
+              <a:schemeClr val="phClr">
+                <a:lumMod val="105000"/>
+                <a:satMod val="103000"/>
+                <a:tint val="73000"/>
+              </a:schemeClr>
+            </a:gs>
+            <a:gs pos="100000">
+              <a:schemeClr val="phClr">
+                <a:lumMod val="105000"/>
+                <a:satMod val="109000"/>
+                <a:tint val="81000"/>
+              </a:schemeClr>
+            </a:gs>
+          </a:gsLst>
+          <a:lin ang="5400000" scaled="0"/>
+        </a:gradFill>
+        <a:gradFill rotWithShape="1">
+          <a:gsLst>
+            <a:gs pos="0">
+              <a:schemeClr val="phClr">
+                <a:satMod val="103000"/>
+                <a:lumMod val="102000"/>
+                <a:tint val="94000"/>
+              </a:schemeClr>
+            </a:gs>
+            <a:gs pos="50000">
+              <a:schemeClr val="phClr">
+                <a:satMod val="110000"/>
+                <a:lumMod val="100000"/>
+                <a:shade val="100000"/>
+              </a:schemeClr>
+            </a:gs>
+            <a:gs pos="100000">
+              <a:schemeClr val="phClr">
+                <a:lumMod val="99000"/>
+                <a:satMod val="120000"/>
+                <a:shade val="78000"/>
+              </a:schemeClr>
+            </a:gs>
+          </a:gsLst>
+          <a:lin ang="5400000" scaled="0"/>
+        </a:gradFill>
+      </a:fillStyleLst>
+      <a:lnStyleLst>
+        <a:ln w="6350" cap="flat" cmpd="sng" algn="ctr">
+          <a:solidFill>
+            <a:schemeClr val="phClr"/>
+          </a:solidFill>
+          <a:prstDash val="solid"/>
+          <a:miter lim="800000"/>
+        </a:ln>
+        <a:ln w="12700" cap="flat" cmpd="sng" algn="ctr">
+          <a:solidFill>
+            <a:schemeClr val="phClr"/>
+          </a:solidFill>
+          <a:prstDash val="solid"/>
+          <a:miter lim="800000"/>
+        </a:ln>
+        <a:ln w="19050" cap="flat" cmpd="sng" algn="ctr">
+          <a:solidFill>
+            <a:schemeClr val="phClr"/>
+          </a:solidFill>
+          <a:prstDash val="solid"/>
+          <a:miter lim="800000"/>
+        </a:ln>
+      </a:lnStyleLst>
+      <a:effectStyleLst>
+        <a:effectStyle>
+          <a:effectLst/>
+        </a:effectStyle>
+        <a:effectStyle>
+          <a:effectLst/>
+        </a:effectStyle>
+        <a:effectStyle>
+          <a:effectLst>
+            <a:outerShdw blurRad="57150" dist="19050" dir="5400000" algn="ctr" rotWithShape="0">
+              <a:srgbClr val="000000">
+                <a:alpha val="63000"/>
+              </a:srgbClr>
+            </a:outerShdw>
+          </a:effectLst>
+        </a:effectStyle>
+      </a:effectStyleLst>
+      <a:bgFillStyleLst>
+        <a:solidFill>
+          <a:schemeClr val="phClr"/>
+        </a:solidFill>
+        <a:solidFill>
+          <a:schemeClr val="phClr">
+            <a:tint val="95000"/>
+            <a:satMod val="170000"/>
+          </a:schemeClr>
+        </a:solidFill>
+        <a:gradFill rotWithShape="1">
+          <a:gsLst>
+            <a:gs pos="0">
+              <a:schemeClr val="phClr">
+                <a:tint val="93000"/>
+                <a:satMod val="150000"/>
+                <a:shade val="98000"/>
+                <a:lumMod val="102000"/>
+              </a:schemeClr>
+            </a:gs>
+            <a:gs pos="50000">
+              <a:schemeClr val="phClr">
+                <a:tint val="98000"/>
+                <a:satMod val="130000"/>
+                <a:shade val="90000"/>
+                <a:lumMod val="103000"/>
+              </a:schemeClr>
+            </a:gs>
+            <a:gs pos="100000">
+              <a:schemeClr val="phClr">
+                <a:shade val="63000"/>
+                <a:satMod val="120000"/>
+              </a:schemeClr>
+            </a:gs>
+          </a:gsLst>
+          <a:lin ang="5400000" scaled="0"/>
+        </a:gradFill>
+      </a:bgFillStyleLst>
+    </a:fmtScheme>
+  </a:themeElements>
+  <a:objectDefaults/>
+  <a:extraClrSchemeLst/>
+  <a:extLst>
+    <a:ext uri="{05A4C25C-085E-4340-85A3-A5531E510DB2}">
+      <thm15:themeFamily xmlns:thm15="http://schemas.microsoft.com/office/thememl/2012/main" name="Office Theme" id="{62F939B6-93AF-4DB8-9C6B-D6C7DFDC589F}" vid="{4A3C46E8-61CC-4603-A589-7422A47A8E4A}"/>
+    </a:ext>
+  </a:extLst>
+</a:theme>
 </file>
</xml_diff>